<commit_message>
pptx finalized/ .ods not changed
</commit_message>
<xml_diff>
--- a/MoCapDataProcessingAndAnalysis.pptx
+++ b/MoCapDataProcessingAndAnalysis.pptx
@@ -5,7 +5,7 @@
     <p:sldMasterId id="2147483694" r:id="rId1"/>
   </p:sldMasterIdLst>
   <p:notesMasterIdLst>
-    <p:notesMasterId r:id="rId23"/>
+    <p:notesMasterId r:id="rId22"/>
   </p:notesMasterIdLst>
   <p:sldIdLst>
     <p:sldId id="256" r:id="rId2"/>
@@ -17,18 +17,17 @@
     <p:sldId id="263" r:id="rId8"/>
     <p:sldId id="269" r:id="rId9"/>
     <p:sldId id="264" r:id="rId10"/>
-    <p:sldId id="270" r:id="rId11"/>
-    <p:sldId id="268" r:id="rId12"/>
-    <p:sldId id="272" r:id="rId13"/>
-    <p:sldId id="273" r:id="rId14"/>
-    <p:sldId id="274" r:id="rId15"/>
-    <p:sldId id="276" r:id="rId16"/>
-    <p:sldId id="265" r:id="rId17"/>
-    <p:sldId id="277" r:id="rId18"/>
-    <p:sldId id="278" r:id="rId19"/>
-    <p:sldId id="279" r:id="rId20"/>
-    <p:sldId id="280" r:id="rId21"/>
-    <p:sldId id="281" r:id="rId22"/>
+    <p:sldId id="268" r:id="rId11"/>
+    <p:sldId id="272" r:id="rId12"/>
+    <p:sldId id="273" r:id="rId13"/>
+    <p:sldId id="274" r:id="rId14"/>
+    <p:sldId id="276" r:id="rId15"/>
+    <p:sldId id="265" r:id="rId16"/>
+    <p:sldId id="277" r:id="rId17"/>
+    <p:sldId id="278" r:id="rId18"/>
+    <p:sldId id="279" r:id="rId19"/>
+    <p:sldId id="280" r:id="rId20"/>
+    <p:sldId id="281" r:id="rId21"/>
   </p:sldIdLst>
   <p:sldSz cx="12192000" cy="6858000"/>
   <p:notesSz cx="6858000" cy="9144000"/>
@@ -651,39 +650,11 @@
           <a:p>
             <a:r>
               <a:rPr lang="bg-BG" dirty="0" smtClean="0"/>
-              <a:t>Методът за идентифициране</a:t>
+              <a:t>Реално погледнато за да пресметнем скоростта на движение на ръката е достатъчно да пресметнем 1ва</a:t>
             </a:r>
             <a:r>
               <a:rPr lang="bg-BG" baseline="0" dirty="0" smtClean="0"/>
-              <a:t> на моментите в които ръката напуска изходна позиция и навлиза в такава, който съм реализирала се базира на изследване на кинематичните свойства на движението на ръката</a:t>
-            </a:r>
-            <a:r>
-              <a:rPr lang="en-US" baseline="0" dirty="0" smtClean="0"/>
-              <a:t>. </a:t>
-            </a:r>
-            <a:r>
-              <a:rPr lang="bg-BG" baseline="0" dirty="0" smtClean="0"/>
-              <a:t>Идеята е, че промяна в траекторията на движение на ръката, може да бъде </a:t>
-            </a:r>
-            <a:r>
-              <a:rPr lang="bg-BG" baseline="0" dirty="0" err="1" smtClean="0"/>
-              <a:t>индикирано</a:t>
-            </a:r>
-            <a:r>
-              <a:rPr lang="bg-BG" baseline="0" dirty="0" smtClean="0"/>
-              <a:t> от промяна в скоростта на движение. </a:t>
-            </a:r>
-          </a:p>
-          <a:p>
-            <a:r>
-              <a:rPr lang="bg-BG" baseline="0" dirty="0" smtClean="0"/>
-              <a:t>Това което виждаме на графиката на слайда е графика на скоростта на движение на дясна ръка по време на цял запис. И погледната така изглежда доста очевидна връзката между скоростта и промяната в траекторията. </a:t>
-            </a:r>
-          </a:p>
-          <a:p>
-            <a:r>
-              <a:rPr lang="bg-BG" baseline="0" dirty="0" smtClean="0"/>
-              <a:t>Сините точки на графиката, показват локални </a:t>
+              <a:t> производна на функцията на траекторията. А за да определим моментите на локалните </a:t>
             </a:r>
             <a:r>
               <a:rPr lang="bg-BG" baseline="0" dirty="0" err="1" smtClean="0"/>
@@ -691,7 +662,29 @@
             </a:r>
             <a:r>
               <a:rPr lang="bg-BG" baseline="0" dirty="0" smtClean="0"/>
-              <a:t>. </a:t>
+              <a:t> е достатъчно да</a:t>
+            </a:r>
+            <a:r>
+              <a:rPr lang="en-US" baseline="0" dirty="0" smtClean="0"/>
+              <a:t> </a:t>
+            </a:r>
+            <a:r>
+              <a:rPr lang="bg-BG" baseline="0" dirty="0" smtClean="0"/>
+              <a:t>се пресметне 2ра производна (или иначе казано ускорението)  и  да се определят моментите, в които функцията променя знака си. </a:t>
+            </a:r>
+          </a:p>
+          <a:p>
+            <a:r>
+              <a:rPr lang="bg-BG" baseline="0" dirty="0" smtClean="0"/>
+              <a:t>Както вече казах, за целта на сегментация се интересувам от цялостното движение на ръката, затова е възможно свеждането на функцията до едно измерение. За целта върху данните за скоростта на движение прилагам нормализация чрез уравнение на </a:t>
+            </a:r>
+            <a:r>
+              <a:rPr lang="bg-BG" baseline="0" dirty="0" err="1" smtClean="0"/>
+              <a:t>Фробениус</a:t>
+            </a:r>
+            <a:r>
+              <a:rPr lang="bg-BG" baseline="0" dirty="0" smtClean="0"/>
+              <a:t>. На фигурата е показан графика на функцията на скоростта по 3те оси ( червена, зелена, синя линия) и резултатната лилава линия – след приложена нормализация.</a:t>
             </a:r>
             <a:endParaRPr lang="en-US" dirty="0"/>
           </a:p>
@@ -723,7 +716,7 @@
     </p:spTree>
     <p:extLst>
       <p:ext uri="{BB962C8B-B14F-4D97-AF65-F5344CB8AC3E}">
-        <p14:creationId xmlns:p14="http://schemas.microsoft.com/office/powerpoint/2010/main" val="828972790"/>
+        <p14:creationId xmlns:p14="http://schemas.microsoft.com/office/powerpoint/2010/main" val="1614717856"/>
       </p:ext>
     </p:extLst>
   </p:cSld>
@@ -779,41 +772,11 @@
           <a:p>
             <a:r>
               <a:rPr lang="bg-BG" dirty="0" smtClean="0"/>
-              <a:t>Реално погледнато за да пресметнем скоростта на движение на ръката е достатъчно да пресметнем 1ва</a:t>
+              <a:t>На тази графика е показана</a:t>
             </a:r>
             <a:r>
               <a:rPr lang="bg-BG" baseline="0" dirty="0" smtClean="0"/>
-              <a:t> производна на функцията на траекторията. А за да определим моментите на локалните </a:t>
-            </a:r>
-            <a:r>
-              <a:rPr lang="bg-BG" baseline="0" dirty="0" err="1" smtClean="0"/>
-              <a:t>екстремуми</a:t>
-            </a:r>
-            <a:r>
-              <a:rPr lang="bg-BG" baseline="0" dirty="0" smtClean="0"/>
-              <a:t> е достатъчно да</a:t>
-            </a:r>
-            <a:r>
-              <a:rPr lang="en-US" baseline="0" dirty="0" smtClean="0"/>
-              <a:t> </a:t>
-            </a:r>
-            <a:r>
-              <a:rPr lang="bg-BG" baseline="0" dirty="0" smtClean="0"/>
-              <a:t>се пресметне 2ра производна (или иначе казано ускорението)  и  да се определят моментите, в които функцията променя знака си. </a:t>
-            </a:r>
-          </a:p>
-          <a:p>
-            <a:r>
-              <a:rPr lang="bg-BG" baseline="0" dirty="0" smtClean="0"/>
-              <a:t>Както вече казах, за целта на сегментация се интересувам от цялостното движение на ръката, затова е възможно свеждането на функцията до едно измерение. За целта върху данните за скоростта на движение прилагам нормализация чрез уравнение на </a:t>
-            </a:r>
-            <a:r>
-              <a:rPr lang="bg-BG" baseline="0" dirty="0" err="1" smtClean="0"/>
-              <a:t>Фробениус</a:t>
-            </a:r>
-            <a:r>
-              <a:rPr lang="bg-BG" baseline="0" dirty="0" smtClean="0"/>
-              <a:t>. На фигурата е показан графика на функцията на скоростта по 3те оси ( червена, зелена, синя линия) и резултатната лилава линия – след приложена нормализация.</a:t>
+              <a:t> графика на функцията на ускорение на движението на ръката. Както се вижда на тази графика започва да се наблюдава шум. Само за сравнение ще покажа графика траекторията. При нея почти не се наблюдава подобен шум, Съществуват различни причини за шум в данните. </a:t>
             </a:r>
             <a:endParaRPr lang="en-US" dirty="0"/>
           </a:p>
@@ -845,7 +808,7 @@
     </p:spTree>
     <p:extLst>
       <p:ext uri="{BB962C8B-B14F-4D97-AF65-F5344CB8AC3E}">
-        <p14:creationId xmlns:p14="http://schemas.microsoft.com/office/powerpoint/2010/main" val="1614717856"/>
+        <p14:creationId xmlns:p14="http://schemas.microsoft.com/office/powerpoint/2010/main" val="4240672215"/>
       </p:ext>
     </p:extLst>
   </p:cSld>
@@ -901,11 +864,43 @@
           <a:p>
             <a:r>
               <a:rPr lang="bg-BG" dirty="0" smtClean="0"/>
-              <a:t>На тази графика е показана</a:t>
+              <a:t>За да избегна грешно намерени точки, прилагам ниско-честотен филтър в/у данните от ускорението на ръката. Същественото при прилагане на такъв филтър е избирането на подходяща</a:t>
             </a:r>
             <a:r>
               <a:rPr lang="bg-BG" baseline="0" dirty="0" smtClean="0"/>
-              <a:t> графика на функцията на ускорение на движението на ръката. Както се вижда на тази графика започва да се наблюдава шум. Само за сравнение ще покажа графика траекторията. При нея почти не се наблюдава подобен шум, Съществуват различни причини за шум в данните. </a:t>
+              <a:t> </a:t>
+            </a:r>
+            <a:r>
+              <a:rPr lang="bg-BG" baseline="0" dirty="0" err="1" smtClean="0"/>
+              <a:t>отрязъчна</a:t>
+            </a:r>
+            <a:r>
+              <a:rPr lang="bg-BG" baseline="0" dirty="0" smtClean="0"/>
+              <a:t> честота. За целта проведох експеримент, след направено проучване. В изследване за американския език на знаците </a:t>
+            </a:r>
+            <a:r>
+              <a:rPr lang="bg-BG" baseline="0" dirty="0" err="1" smtClean="0"/>
+              <a:t>МкДоналд</a:t>
+            </a:r>
+            <a:r>
+              <a:rPr lang="bg-BG" baseline="0" dirty="0" smtClean="0"/>
+              <a:t> изследва причините за възникване на шум. Според неговото изследване, шум с честота над 12</a:t>
+            </a:r>
+            <a:r>
+              <a:rPr lang="en-US" baseline="0" dirty="0" smtClean="0"/>
+              <a:t>Hz </a:t>
+            </a:r>
+            <a:r>
+              <a:rPr lang="bg-BG" baseline="0" dirty="0" smtClean="0"/>
+              <a:t>се дължи на записваща техник и може да бъде елиминиран. Друг резултат от това изследване е че представя таблица с части от тялото и честоти на движение които те могат да предизвикат. На базата на праговите честоти представени в тази таблица – за китка това е 4-5 </a:t>
+            </a:r>
+            <a:r>
+              <a:rPr lang="en-US" baseline="0" dirty="0" smtClean="0"/>
+              <a:t>Hz </a:t>
+            </a:r>
+            <a:r>
+              <a:rPr lang="bg-BG" baseline="0" dirty="0" smtClean="0"/>
+              <a:t>направих сравнение с резултатните графики и след прилагане на филтъра. Експериментът извърших в/ъ различни сегменти от 4 тестови входни файла. </a:t>
             </a:r>
             <a:endParaRPr lang="en-US" dirty="0"/>
           </a:p>
@@ -937,7 +932,7 @@
     </p:spTree>
     <p:extLst>
       <p:ext uri="{BB962C8B-B14F-4D97-AF65-F5344CB8AC3E}">
-        <p14:creationId xmlns:p14="http://schemas.microsoft.com/office/powerpoint/2010/main" val="4240672215"/>
+        <p14:creationId xmlns:p14="http://schemas.microsoft.com/office/powerpoint/2010/main" val="2952126023"/>
       </p:ext>
     </p:extLst>
   </p:cSld>
@@ -993,43 +988,51 @@
           <a:p>
             <a:r>
               <a:rPr lang="bg-BG" dirty="0" smtClean="0"/>
-              <a:t>За да избегна грешно намерени точки, прилагам ниско-честотен филтър в/у данните от ускорението на ръката. Същественото при прилагане на такъв филтър е избирането на подходяща</a:t>
+              <a:t>Вече след като обясних</a:t>
+            </a:r>
+            <a:r>
+              <a:rPr lang="bg-BG" baseline="0" dirty="0" smtClean="0"/>
+              <a:t> как се стига до тази  графика и какво представлява тя, може да се върна на нея и да обясня </a:t>
+            </a:r>
+            <a:r>
+              <a:rPr lang="bg-BG" baseline="0" dirty="0" err="1" smtClean="0"/>
+              <a:t>т.нар</a:t>
             </a:r>
             <a:r>
               <a:rPr lang="bg-BG" baseline="0" dirty="0" smtClean="0"/>
               <a:t> </a:t>
             </a:r>
             <a:r>
+              <a:rPr lang="en-US" baseline="0" dirty="0" smtClean="0"/>
+              <a:t>labeling </a:t>
+            </a:r>
+            <a:r>
+              <a:rPr lang="bg-BG" baseline="0" dirty="0" smtClean="0"/>
+              <a:t>процес или иначе казано етикиране на моментите, които представляват интерес за сегментацията. За този процес съм реализирала прагова функция, която цели да филтрира моментите в които ръката е в изходна позиция – </a:t>
+            </a:r>
+            <a:r>
+              <a:rPr lang="en-US" baseline="0" dirty="0" smtClean="0"/>
+              <a:t>RP</a:t>
+            </a:r>
+            <a:r>
+              <a:rPr lang="bg-BG" baseline="0" dirty="0" smtClean="0"/>
+              <a:t>. За разлика от говоримия изказ, разделянето на думи става с пауза- тишина, тук скоростта на ръката никога не е нула. Затова и е необходимо реализирането на прагова функция.  Ако стойността на скоростта в този момент е под прага се отбелязва с 0, иначе с 1. Така последователността от 0 и 1 се разглежда последователно и за старт се избират кадри които са отбелязани с 0 и са </a:t>
+            </a:r>
+            <a:r>
               <a:rPr lang="bg-BG" baseline="0" dirty="0" err="1" smtClean="0"/>
-              <a:t>отрязъчна</a:t>
+              <a:t>предходвани</a:t>
             </a:r>
             <a:r>
               <a:rPr lang="bg-BG" baseline="0" dirty="0" smtClean="0"/>
-              <a:t> честота. За целта проведох експеримент, след направено проучване. В изследване за американския език на знаците </a:t>
+              <a:t> от поне една 0 и последвани от поне две 1, а з край – кадри, отбелязани с 1 и са </a:t>
             </a:r>
             <a:r>
               <a:rPr lang="bg-BG" baseline="0" dirty="0" err="1" smtClean="0"/>
-              <a:t>МкДоналд</a:t>
+              <a:t>предходвани</a:t>
             </a:r>
             <a:r>
               <a:rPr lang="bg-BG" baseline="0" dirty="0" smtClean="0"/>
-              <a:t> изследва причините за възникване на шум. Според неговото изследване, шум с честота над 12</a:t>
-            </a:r>
-            <a:r>
-              <a:rPr lang="en-US" baseline="0" dirty="0" smtClean="0"/>
-              <a:t>Hz </a:t>
-            </a:r>
-            <a:r>
-              <a:rPr lang="bg-BG" baseline="0" dirty="0" smtClean="0"/>
-              <a:t>се дължи на записваща техник и може да бъде елиминиран. Друг резултат от това изследване е че представя таблица с части от тялото и честоти на движение които те могат да предизвикат. На базата на праговите честоти представени в тази таблица – за китка това е 4-5 </a:t>
-            </a:r>
-            <a:r>
-              <a:rPr lang="en-US" baseline="0" dirty="0" smtClean="0"/>
-              <a:t>Hz </a:t>
-            </a:r>
-            <a:r>
-              <a:rPr lang="bg-BG" baseline="0" dirty="0" smtClean="0"/>
-              <a:t>направих сравнение с резултатните графики и след прилагане на филтъра. Експериментът извърших в/ъ различни сегменти от 4 тестови входни файла. </a:t>
+              <a:t> от поне една 1 и последвани от две 0. Тъй като се цели определяне на моменти, в които ръката напуска/ навлиза изходна позиция, се прави и проверка, дали позицията и е в областта на ханша. Крайният резултат от тази функция е списък от двойки номера на начален и краен кадър. Знаейки тези номера, ги използвам за да анализирам статистически, стойностите на скоростта по време на така наречената изходна позиция, които в идеалния случай биха били нула, но в реалния никога не са. За да съм сигурна в коректността на крайния метод, повтарям процедурата с нова стойност на параметъра за праговата функция, избран от стойностите на скоростта по времена изходната поза.</a:t>
             </a:r>
             <a:endParaRPr lang="en-US" dirty="0"/>
           </a:p>
@@ -1061,7 +1064,7 @@
     </p:spTree>
     <p:extLst>
       <p:ext uri="{BB962C8B-B14F-4D97-AF65-F5344CB8AC3E}">
-        <p14:creationId xmlns:p14="http://schemas.microsoft.com/office/powerpoint/2010/main" val="2952126023"/>
+        <p14:creationId xmlns:p14="http://schemas.microsoft.com/office/powerpoint/2010/main" val="3895402769"/>
       </p:ext>
     </p:extLst>
   </p:cSld>
@@ -1117,51 +1120,25 @@
           <a:p>
             <a:r>
               <a:rPr lang="bg-BG" dirty="0" smtClean="0"/>
-              <a:t>Вече след като обясних</a:t>
+              <a:t>Разполагайки с моментите, в които ръката напуска</a:t>
             </a:r>
             <a:r>
               <a:rPr lang="bg-BG" baseline="0" dirty="0" smtClean="0"/>
-              <a:t> как се стига до тази  графика и какво представлява тя, може да се върна на нея и да обясня </a:t>
+              <a:t> изходна позиция и навлиза в такава, мога да анализирам всеки сегмент индивидуално. </a:t>
+            </a:r>
+          </a:p>
+          <a:p>
+            <a:r>
+              <a:rPr lang="bg-BG" baseline="0" dirty="0" smtClean="0"/>
+              <a:t>1ва стъпка в този процес е да определя началото и краят на съществената част от знака. Този процес отново се базира на скоростта на движение на ръката, и за началото имаме - 1я минимум след 1я максимум и съответно последния минимум след последния максимум. Това се обяснява по чисто физически причини- за да достигне до позицията в която ръката ще извърши знака или когато приключи знака и за да се върне в изходна позиция, има момент на подготовка. За съжаление в някои случаи, крайният момент не винаги е ясно изразен. Просто защото когато човек извършва движението, в началото е много по концентриран в това какво трябва да направи от колкото в края, понякога ръката просто плавно продължава движението си, </a:t>
             </a:r>
             <a:r>
               <a:rPr lang="bg-BG" baseline="0" dirty="0" err="1" smtClean="0"/>
-              <a:t>т.нар</a:t>
+              <a:t>намаляйки</a:t>
             </a:r>
             <a:r>
               <a:rPr lang="bg-BG" baseline="0" dirty="0" smtClean="0"/>
-              <a:t> </a:t>
-            </a:r>
-            <a:r>
-              <a:rPr lang="en-US" baseline="0" dirty="0" smtClean="0"/>
-              <a:t>labeling </a:t>
-            </a:r>
-            <a:r>
-              <a:rPr lang="bg-BG" baseline="0" dirty="0" smtClean="0"/>
-              <a:t>процес или иначе казано етикиране на моментите, които представляват интерес за сегментацията. За този процес съм реализирала прагова функция, която цели да филтрира моментите в които ръката е в изходна позиция – </a:t>
-            </a:r>
-            <a:r>
-              <a:rPr lang="en-US" baseline="0" dirty="0" smtClean="0"/>
-              <a:t>RP</a:t>
-            </a:r>
-            <a:r>
-              <a:rPr lang="bg-BG" baseline="0" dirty="0" smtClean="0"/>
-              <a:t>. За разлика от говоримия изказ, разделянето на думи става с пауза- тишина, тук скоростта на ръката никога не е нула. Затова и е необходимо реализирането на прагова функция.  Ако стойността на скоростта в този момент е под прага се отбелязва с 0, иначе с 1. Така последователността от 0 и 1 се разглежда последователно и за старт се избират кадри които са отбелязани с 0 и са </a:t>
-            </a:r>
-            <a:r>
-              <a:rPr lang="bg-BG" baseline="0" dirty="0" err="1" smtClean="0"/>
-              <a:t>предходвани</a:t>
-            </a:r>
-            <a:r>
-              <a:rPr lang="bg-BG" baseline="0" dirty="0" smtClean="0"/>
-              <a:t> от поне една 0 и последвани от поне две 1, а з край – кадри, отбелязани с 1 и са </a:t>
-            </a:r>
-            <a:r>
-              <a:rPr lang="bg-BG" baseline="0" dirty="0" err="1" smtClean="0"/>
-              <a:t>предходвани</a:t>
-            </a:r>
-            <a:r>
-              <a:rPr lang="bg-BG" baseline="0" dirty="0" smtClean="0"/>
-              <a:t> от поне една 1 и последвани от две 0. Тъй като се цели определяне на моменти, в които ръката напуска/ навлиза изходна позиция, се прави и проверка, дали позицията и е в областта на ханша. Крайният резултат от тази функция е списък от двойки номера на начален и краен кадър. Знаейки тези номера, ги използвам за да анализирам статистически, стойностите на скоростта по време на така наречената изходна позиция, които в идеалния случай биха били нула, но в реалния никога не са. За да съм сигурна в коректността на крайния метод, повтарям процедурата с нова стойност на параметъра за праговата функция, избран от стойностите на скоростта по времена изходната поза.</a:t>
+              <a:t> скоростта си докато достигне изходна позиция. </a:t>
             </a:r>
             <a:endParaRPr lang="en-US" dirty="0"/>
           </a:p>
@@ -1193,7 +1170,7 @@
     </p:spTree>
     <p:extLst>
       <p:ext uri="{BB962C8B-B14F-4D97-AF65-F5344CB8AC3E}">
-        <p14:creationId xmlns:p14="http://schemas.microsoft.com/office/powerpoint/2010/main" val="3895402769"/>
+        <p14:creationId xmlns:p14="http://schemas.microsoft.com/office/powerpoint/2010/main" val="790089576"/>
       </p:ext>
     </p:extLst>
   </p:cSld>
@@ -1249,25 +1226,11 @@
           <a:p>
             <a:r>
               <a:rPr lang="bg-BG" dirty="0" smtClean="0"/>
-              <a:t>Разполагайки с моментите, в които ръката напуска</a:t>
+              <a:t>Ето пример за един знак</a:t>
             </a:r>
             <a:r>
               <a:rPr lang="bg-BG" baseline="0" dirty="0" smtClean="0"/>
-              <a:t> изходна позиция и навлиза в такава, мога да анализирам всеки сегмент индивидуално. </a:t>
-            </a:r>
-          </a:p>
-          <a:p>
-            <a:r>
-              <a:rPr lang="bg-BG" baseline="0" dirty="0" smtClean="0"/>
-              <a:t>1ва стъпка в този процес е да определя началото и краят на съществената част от знака. Този процес отново се базира на скоростта на движение на ръката, и за началото имаме - 1я минимум след 1я максимум и съответно последния минимум след последния максимум. Това се обяснява по чисто физически причини- за да достигне до позицията в която ръката ще извърши знака или когато приключи знака и за да се върне в изходна позиция, има момент на подготовка. За съжаление в някои случаи, крайният момент не винаги е ясно изразен. Просто защото когато човек извършва движението, в началото е много по концентриран в това какво трябва да направи от колкото в края, понякога ръката просто плавно продължава движението си, </a:t>
-            </a:r>
-            <a:r>
-              <a:rPr lang="bg-BG" baseline="0" dirty="0" err="1" smtClean="0"/>
-              <a:t>намаляйки</a:t>
-            </a:r>
-            <a:r>
-              <a:rPr lang="bg-BG" baseline="0" dirty="0" smtClean="0"/>
-              <a:t> скоростта си докато достигне изходна позиция. </a:t>
+              <a:t> и изход на системата. Определено е дали знакът се изпълнява с една или две ръце, коя е доминантната ръка, местоположението на ръцете по-време на знака. За определяне на доминантна ръка, съм реализирала метод който изчислява общото изместване на всяка от двете ръце и сравняване на двете стойности спрямо прагова стойност ( =9/10 от средно аритметично отместване на 2те ръце и длани). За да се определи местоположението на ръката, пространството за извършване на знаците пред човека съм разделила на 15 области.</a:t>
             </a:r>
             <a:endParaRPr lang="en-US" dirty="0"/>
           </a:p>
@@ -1299,7 +1262,7 @@
     </p:spTree>
     <p:extLst>
       <p:ext uri="{BB962C8B-B14F-4D97-AF65-F5344CB8AC3E}">
-        <p14:creationId xmlns:p14="http://schemas.microsoft.com/office/powerpoint/2010/main" val="790089576"/>
+        <p14:creationId xmlns:p14="http://schemas.microsoft.com/office/powerpoint/2010/main" val="2005768282"/>
       </p:ext>
     </p:extLst>
   </p:cSld>
@@ -1359,7 +1322,53 @@
             </a:r>
             <a:r>
               <a:rPr lang="bg-BG" baseline="0" dirty="0" smtClean="0"/>
-              <a:t> и изход на системата. Определено е дали знакът се изпълнява с една или две ръце, коя е доминантната ръка, местоположението на ръцете по-време на знака. За определяне на доминантна ръка, съм реализирала метод който изчислява общото изместване на всяка от двете ръце и сравняване на двете стойности спрямо прагова стойност ( =9/10 от средно аритметично отместване на 2те ръце и длани). За да се определи местоположението на ръката, пространството за извършване на знаците пред човека съм разделила на 15 области.</a:t>
+              <a:t> и изход на системата. Определено е дали знакът се изпълнява с една или две ръце, коя е доминантната ръка, местоположението на ръцете по-време на знака. За да се определи местоположението на ръката, пространството за извършване на знаците пред човека съм разделила на 15 области. Разделението е базирано на разделението на пространството на </a:t>
+            </a:r>
+            <a:r>
+              <a:rPr lang="bg-BG" baseline="0" dirty="0" err="1" smtClean="0"/>
+              <a:t>Хмабургската</a:t>
+            </a:r>
+            <a:r>
+              <a:rPr lang="bg-BG" baseline="0" dirty="0" smtClean="0"/>
+              <a:t> система за обозначаване на знаци. Границите на тези 15 зони се определят от позицията на маркерите за всеки кадър, също така има зададени допустими граници (</a:t>
+            </a:r>
+            <a:r>
+              <a:rPr lang="en-US" baseline="0" dirty="0" smtClean="0"/>
+              <a:t>margin), </a:t>
+            </a:r>
+            <a:r>
+              <a:rPr lang="bg-BG" baseline="0" dirty="0" smtClean="0"/>
+              <a:t>които отново се изчисляват динамично за всеки кадър. (вертикална – 1/10 от дължината на торса, </a:t>
+            </a:r>
+            <a:r>
+              <a:rPr lang="bg-BG" baseline="0" dirty="0" err="1" smtClean="0"/>
+              <a:t>хориз</a:t>
+            </a:r>
+            <a:r>
+              <a:rPr lang="bg-BG" baseline="0" dirty="0" smtClean="0"/>
+              <a:t> – 2/10 от ширината на раменете)</a:t>
+            </a:r>
+          </a:p>
+          <a:p>
+            <a:r>
+              <a:rPr lang="bg-BG" baseline="0" dirty="0" smtClean="0"/>
+              <a:t>Статистическата информация, която се извежда – </a:t>
+            </a:r>
+            <a:r>
+              <a:rPr lang="bg-BG" baseline="0" dirty="0" err="1" smtClean="0"/>
+              <a:t>бр</a:t>
+            </a:r>
+            <a:r>
+              <a:rPr lang="bg-BG" baseline="0" dirty="0" smtClean="0"/>
+              <a:t> промени на областите, времето прекарано в дадена област целят да бъдат използвани за </a:t>
+            </a:r>
+            <a:r>
+              <a:rPr lang="bg-BG" baseline="0" dirty="0" err="1" smtClean="0"/>
+              <a:t>понататъшно</a:t>
+            </a:r>
+            <a:r>
+              <a:rPr lang="bg-BG" baseline="0" dirty="0" smtClean="0"/>
+              <a:t> анализиране на знака, при описание на движението и определяне дали знакът е симетричен – огледален или паралелен. </a:t>
             </a:r>
             <a:endParaRPr lang="en-US" dirty="0"/>
           </a:p>
@@ -1391,7 +1400,7 @@
     </p:spTree>
     <p:extLst>
       <p:ext uri="{BB962C8B-B14F-4D97-AF65-F5344CB8AC3E}">
-        <p14:creationId xmlns:p14="http://schemas.microsoft.com/office/powerpoint/2010/main" val="2005768282"/>
+        <p14:creationId xmlns:p14="http://schemas.microsoft.com/office/powerpoint/2010/main" val="2430840172"/>
       </p:ext>
     </p:extLst>
   </p:cSld>
@@ -1447,57 +1456,40 @@
           <a:p>
             <a:r>
               <a:rPr lang="bg-BG" dirty="0" smtClean="0"/>
-              <a:t>Ето пример за един знак</a:t>
+              <a:t>Както вече обясних сегментирането на знаците не е</a:t>
             </a:r>
             <a:r>
               <a:rPr lang="bg-BG" baseline="0" dirty="0" smtClean="0"/>
-              <a:t> и изход на системата. Определено е дали знакът се изпълнява с една или две ръце, коя е доминантната ръка, местоположението на ръцете по-време на знака. За да се определи местоположението на ръката, пространството за извършване на знаците пред човека съм разделила на 15 области. Разделението е базирано на разделението на пространството на </a:t>
-            </a:r>
-            <a:r>
-              <a:rPr lang="bg-BG" baseline="0" dirty="0" err="1" smtClean="0"/>
-              <a:t>Хмабургската</a:t>
+              <a:t> лесен процес за реализиране от система, дори когато този процес се извършва от експерти лингвисти или от глухо-неми събужда противоречия. За да мога да оценя коректността на данните на системата, извърших ръчно сегментиране на 4 тестови файла. Моите резултати бяха съпоставени с тези на чешки студент, който работи по последващата обработка на данните след запис. </a:t>
+            </a:r>
+            <a:endParaRPr lang="bg-BG" dirty="0" smtClean="0"/>
+          </a:p>
+          <a:p>
+            <a:r>
+              <a:rPr lang="bg-BG" dirty="0" smtClean="0"/>
+              <a:t>На таблицата са показани резултати от сравняването на резултатите от автоматична и ръчно извършена сегментация. </a:t>
+            </a:r>
+          </a:p>
+          <a:p>
+            <a:r>
+              <a:rPr lang="bg-BG" dirty="0" smtClean="0"/>
+              <a:t>При</a:t>
             </a:r>
             <a:r>
               <a:rPr lang="bg-BG" baseline="0" dirty="0" smtClean="0"/>
-              <a:t> система за обозначаване на знаци. Границите на тези 15 зони се определят от позицията на маркерите за всеки кадър, също така има зададени допустими граници (</a:t>
-            </a:r>
-            <a:r>
-              <a:rPr lang="en-US" baseline="0" dirty="0" smtClean="0"/>
-              <a:t>margin), </a:t>
-            </a:r>
+              <a:t> груба сегментация – за да се определи началния кадър на текущия знак за правилен, той трябва да е между крайния кадър на предходния знак и началния на текущия от ръчната сегментация. Съответно крайния – м/у крайния на текущия и началния на следващия. </a:t>
+            </a:r>
+          </a:p>
+          <a:p>
             <a:r>
               <a:rPr lang="bg-BG" baseline="0" dirty="0" smtClean="0"/>
-              <a:t>които отново се изчисляват динамично за всеки кадър. (вертикална – 1/10 от дължината на торса, </a:t>
-            </a:r>
-            <a:r>
-              <a:rPr lang="bg-BG" baseline="0" dirty="0" err="1" smtClean="0"/>
-              <a:t>хориз</a:t>
-            </a:r>
+              <a:t>Както се вижда определянето на началото е много по-точно от определянето на края, друго важно да се отбележи е средната грешка е 13 кадъра, което е по-малко от 0,1 сек. В проект за френския език на знаците, които използват този метод за сегментация, за да прецизират ръчно сегментирани данни отклонение от 0,15сек се смята за незначително. </a:t>
+            </a:r>
+          </a:p>
+          <a:p>
             <a:r>
               <a:rPr lang="bg-BG" baseline="0" dirty="0" smtClean="0"/>
-              <a:t> – 2/10 от ширината на раменете)</a:t>
-            </a:r>
-          </a:p>
-          <a:p>
-            <a:r>
-              <a:rPr lang="bg-BG" baseline="0" dirty="0" smtClean="0"/>
-              <a:t>Статистическата информация, която се извежда – </a:t>
-            </a:r>
-            <a:r>
-              <a:rPr lang="bg-BG" baseline="0" dirty="0" err="1" smtClean="0"/>
-              <a:t>бр</a:t>
-            </a:r>
-            <a:r>
-              <a:rPr lang="bg-BG" baseline="0" dirty="0" smtClean="0"/>
-              <a:t> промени на областите, времето прекарано в дадена област целят да бъдат използвани за </a:t>
-            </a:r>
-            <a:r>
-              <a:rPr lang="bg-BG" baseline="0" dirty="0" err="1" smtClean="0"/>
-              <a:t>понататъшно</a:t>
-            </a:r>
-            <a:r>
-              <a:rPr lang="bg-BG" baseline="0" dirty="0" smtClean="0"/>
-              <a:t> анализиране на знака, при описание на движението и определяне дали знакът е симетричен – огледален или паралелен. </a:t>
+              <a:t>При 2то ниво на сегментация, за да определя началото и края за коректни, трябва грешката да е по-малко от 6 кадъра, тъй като това е средната грешка. </a:t>
             </a:r>
             <a:endParaRPr lang="en-US" dirty="0"/>
           </a:p>
@@ -1529,7 +1521,7 @@
     </p:spTree>
     <p:extLst>
       <p:ext uri="{BB962C8B-B14F-4D97-AF65-F5344CB8AC3E}">
-        <p14:creationId xmlns:p14="http://schemas.microsoft.com/office/powerpoint/2010/main" val="2430840172"/>
+        <p14:creationId xmlns:p14="http://schemas.microsoft.com/office/powerpoint/2010/main" val="1138027678"/>
       </p:ext>
     </p:extLst>
   </p:cSld>
@@ -1583,43 +1575,6 @@
           <a:bodyPr/>
           <a:lstStyle/>
           <a:p>
-            <a:r>
-              <a:rPr lang="bg-BG" dirty="0" smtClean="0"/>
-              <a:t>Както вече обясних сегментирането на знаците не е</a:t>
-            </a:r>
-            <a:r>
-              <a:rPr lang="bg-BG" baseline="0" dirty="0" smtClean="0"/>
-              <a:t> лесен процес за реализиране от система, дори когато този процес се извършва от експерти лингвисти или от глухо-неми събужда противоречия. За да мога да оценя коректността на данните на системата, извърших ръчно сегментиране на 4 тестови файла. Моите резултати бяха съпоставени с тези на чешки студент, който работи по последващата обработка на данните след запис. </a:t>
-            </a:r>
-            <a:endParaRPr lang="bg-BG" dirty="0" smtClean="0"/>
-          </a:p>
-          <a:p>
-            <a:r>
-              <a:rPr lang="bg-BG" dirty="0" smtClean="0"/>
-              <a:t>На таблицата са показани резултати от сравняването на резултатите от автоматична и ръчно извършена сегментация. </a:t>
-            </a:r>
-          </a:p>
-          <a:p>
-            <a:r>
-              <a:rPr lang="bg-BG" dirty="0" smtClean="0"/>
-              <a:t>При</a:t>
-            </a:r>
-            <a:r>
-              <a:rPr lang="bg-BG" baseline="0" dirty="0" smtClean="0"/>
-              <a:t> груба сегментация – за да се определи началния кадър на текущия знак за правилен, той трябва да е между крайния кадър на предходния знак и началния на текущия от ръчната сегментация. Съответно крайния – м/у крайния на текущия и началния на следващия. </a:t>
-            </a:r>
-          </a:p>
-          <a:p>
-            <a:r>
-              <a:rPr lang="bg-BG" baseline="0" dirty="0" smtClean="0"/>
-              <a:t>Както се вижда определянето на началото е много по-точно от определянето на края, друго важно да се отбележи е средната грешка е 13 кадъра, което е по-малко от 0,1 сек. В проект за френския език на знаците, които използват този метод за сегментация, за да прецизират ръчно сегментирани данни отклонение от 0,15сек се смята за незначително. </a:t>
-            </a:r>
-          </a:p>
-          <a:p>
-            <a:r>
-              <a:rPr lang="bg-BG" baseline="0" dirty="0" smtClean="0"/>
-              <a:t>При 2то ниво на сегментация, за да определя началото и края за коректни, трябва грешката да е по-малко от 6 кадъра, тъй като това е средната грешка. </a:t>
-            </a:r>
             <a:endParaRPr lang="en-US" dirty="0"/>
           </a:p>
         </p:txBody>
@@ -1650,7 +1605,7 @@
     </p:spTree>
     <p:extLst>
       <p:ext uri="{BB962C8B-B14F-4D97-AF65-F5344CB8AC3E}">
-        <p14:creationId xmlns:p14="http://schemas.microsoft.com/office/powerpoint/2010/main" val="1138027678"/>
+        <p14:creationId xmlns:p14="http://schemas.microsoft.com/office/powerpoint/2010/main" val="1926637390"/>
       </p:ext>
     </p:extLst>
   </p:cSld>
@@ -1734,7 +1689,7 @@
     </p:spTree>
     <p:extLst>
       <p:ext uri="{BB962C8B-B14F-4D97-AF65-F5344CB8AC3E}">
-        <p14:creationId xmlns:p14="http://schemas.microsoft.com/office/powerpoint/2010/main" val="1926637390"/>
+        <p14:creationId xmlns:p14="http://schemas.microsoft.com/office/powerpoint/2010/main" val="1966379810"/>
       </p:ext>
     </p:extLst>
   </p:cSld>
@@ -1908,90 +1863,6 @@
     <p:extLst>
       <p:ext uri="{BB962C8B-B14F-4D97-AF65-F5344CB8AC3E}">
         <p14:creationId xmlns:p14="http://schemas.microsoft.com/office/powerpoint/2010/main" val="832004748"/>
-      </p:ext>
-    </p:extLst>
-  </p:cSld>
-  <p:clrMapOvr>
-    <a:masterClrMapping/>
-  </p:clrMapOvr>
-</p:notes>
-</file>
-
-<file path=ppt/notesSlides/notesSlide20.xml><?xml version="1.0" encoding="utf-8"?>
-<p:notes xmlns:a="http://schemas.openxmlformats.org/drawingml/2006/main" xmlns:r="http://schemas.openxmlformats.org/officeDocument/2006/relationships" xmlns:p="http://schemas.openxmlformats.org/presentationml/2006/main">
-  <p:cSld>
-    <p:spTree>
-      <p:nvGrpSpPr>
-        <p:cNvPr id="1" name=""/>
-        <p:cNvGrpSpPr/>
-        <p:nvPr/>
-      </p:nvGrpSpPr>
-      <p:grpSpPr>
-        <a:xfrm>
-          <a:off x="0" y="0"/>
-          <a:ext cx="0" cy="0"/>
-          <a:chOff x="0" y="0"/>
-          <a:chExt cx="0" cy="0"/>
-        </a:xfrm>
-      </p:grpSpPr>
-      <p:sp>
-        <p:nvSpPr>
-          <p:cNvPr id="2" name="Slide Image Placeholder 1"/>
-          <p:cNvSpPr>
-            <a:spLocks noGrp="1" noRot="1" noChangeAspect="1"/>
-          </p:cNvSpPr>
-          <p:nvPr>
-            <p:ph type="sldImg"/>
-          </p:nvPr>
-        </p:nvSpPr>
-        <p:spPr/>
-      </p:sp>
-      <p:sp>
-        <p:nvSpPr>
-          <p:cNvPr id="3" name="Notes Placeholder 2"/>
-          <p:cNvSpPr>
-            <a:spLocks noGrp="1"/>
-          </p:cNvSpPr>
-          <p:nvPr>
-            <p:ph type="body" idx="1"/>
-          </p:nvPr>
-        </p:nvSpPr>
-        <p:spPr/>
-        <p:txBody>
-          <a:bodyPr/>
-          <a:lstStyle/>
-          <a:p>
-            <a:endParaRPr lang="en-US" dirty="0"/>
-          </a:p>
-        </p:txBody>
-      </p:sp>
-      <p:sp>
-        <p:nvSpPr>
-          <p:cNvPr id="4" name="Slide Number Placeholder 3"/>
-          <p:cNvSpPr>
-            <a:spLocks noGrp="1"/>
-          </p:cNvSpPr>
-          <p:nvPr>
-            <p:ph type="sldNum" sz="quarter" idx="10"/>
-          </p:nvPr>
-        </p:nvSpPr>
-        <p:spPr/>
-        <p:txBody>
-          <a:bodyPr/>
-          <a:lstStyle/>
-          <a:p>
-            <a:fld id="{B6D4A564-F552-4F28-8F66-E5B124E9738F}" type="slidenum">
-              <a:rPr lang="en-US" smtClean="0"/>
-              <a:t>21</a:t>
-            </a:fld>
-            <a:endParaRPr lang="en-US"/>
-          </a:p>
-        </p:txBody>
-      </p:sp>
-    </p:spTree>
-    <p:extLst>
-      <p:ext uri="{BB962C8B-B14F-4D97-AF65-F5344CB8AC3E}">
-        <p14:creationId xmlns:p14="http://schemas.microsoft.com/office/powerpoint/2010/main" val="1966379810"/>
       </p:ext>
     </p:extLst>
   </p:cSld>
@@ -2940,23 +2811,57 @@
             </a:r>
           </a:p>
           <a:p>
-            <a:pPr marL="0" marR="0" indent="0" algn="l" defTabSz="914400" rtl="0" eaLnBrk="1" fontAlgn="auto" latinLnBrk="0" hangingPunct="1">
-              <a:lnSpc>
-                <a:spcPct val="100000"/>
-              </a:lnSpc>
-              <a:spcBef>
-                <a:spcPts val="0"/>
-              </a:spcBef>
-              <a:spcAft>
-                <a:spcPts val="0"/>
-              </a:spcAft>
-              <a:buClrTx/>
-              <a:buSzTx/>
-              <a:buFontTx/>
-              <a:buNone/>
-              <a:tabLst/>
-              <a:defRPr/>
-            </a:pPr>
+            <a:endParaRPr lang="en-US" dirty="0" smtClean="0"/>
+          </a:p>
+          <a:p>
+            <a:r>
+              <a:rPr lang="bg-BG" dirty="0" smtClean="0"/>
+              <a:t>Методът </a:t>
+            </a:r>
+            <a:r>
+              <a:rPr lang="bg-BG" dirty="0" smtClean="0"/>
+              <a:t>за идентифициране</a:t>
+            </a:r>
+            <a:r>
+              <a:rPr lang="bg-BG" baseline="0" dirty="0" smtClean="0"/>
+              <a:t> на моментите в които ръката напуска изходна позиция и навлиза в такава, който съм реализирала се базира на изследване на кинематичните свойства на движението на ръката</a:t>
+            </a:r>
+            <a:r>
+              <a:rPr lang="en-US" baseline="0" dirty="0" smtClean="0"/>
+              <a:t>. </a:t>
+            </a:r>
+            <a:r>
+              <a:rPr lang="bg-BG" baseline="0" dirty="0" smtClean="0"/>
+              <a:t>Идеята е, че промяна в траекторията на движение на ръката, може да бъде </a:t>
+            </a:r>
+            <a:r>
+              <a:rPr lang="bg-BG" baseline="0" dirty="0" err="1" smtClean="0"/>
+              <a:t>индикирано</a:t>
+            </a:r>
+            <a:r>
+              <a:rPr lang="bg-BG" baseline="0" dirty="0" smtClean="0"/>
+              <a:t> от промяна в скоростта на движение. </a:t>
+            </a:r>
+          </a:p>
+          <a:p>
+            <a:r>
+              <a:rPr lang="bg-BG" baseline="0" dirty="0" smtClean="0"/>
+              <a:t>Това което виждаме на графиката на слайда е графика на скоростта на движение на дясна ръка по време на цял запис. И погледната така изглежда доста очевидна връзката между скоростта и промяната в траекторията. </a:t>
+            </a:r>
+          </a:p>
+          <a:p>
+            <a:r>
+              <a:rPr lang="bg-BG" baseline="0" dirty="0" smtClean="0"/>
+              <a:t>Сините точки на графиката, показват локални </a:t>
+            </a:r>
+            <a:r>
+              <a:rPr lang="bg-BG" baseline="0" dirty="0" err="1" smtClean="0"/>
+              <a:t>екстремуми</a:t>
+            </a:r>
+            <a:r>
+              <a:rPr lang="bg-BG" baseline="0" dirty="0" smtClean="0"/>
+              <a:t>. </a:t>
+            </a:r>
             <a:endParaRPr lang="en-US" dirty="0"/>
           </a:p>
         </p:txBody>
@@ -2987,7 +2892,7 @@
     </p:spTree>
     <p:extLst>
       <p:ext uri="{BB962C8B-B14F-4D97-AF65-F5344CB8AC3E}">
-        <p14:creationId xmlns:p14="http://schemas.microsoft.com/office/powerpoint/2010/main" val="1205486959"/>
+        <p14:creationId xmlns:p14="http://schemas.microsoft.com/office/powerpoint/2010/main" val="828972790"/>
       </p:ext>
     </p:extLst>
   </p:cSld>
@@ -7452,7 +7357,12 @@
             <p:ph type="title"/>
           </p:nvPr>
         </p:nvSpPr>
-        <p:spPr/>
+        <p:spPr>
+          <a:xfrm>
+            <a:off x="1097280" y="286603"/>
+            <a:ext cx="10058400" cy="725845"/>
+          </a:xfrm>
+        </p:spPr>
         <p:txBody>
           <a:bodyPr/>
           <a:lstStyle/>
@@ -7483,6 +7393,30 @@
             <a:r>
               <a:rPr lang="en-US" smtClean="0"/>
               <a:t>9/20/2018</a:t>
+            </a:r>
+            <a:endParaRPr lang="en-US" dirty="0"/>
+          </a:p>
+        </p:txBody>
+      </p:sp>
+      <p:sp>
+        <p:nvSpPr>
+          <p:cNvPr id="9" name="Footer Placeholder 3"/>
+          <p:cNvSpPr>
+            <a:spLocks noGrp="1"/>
+          </p:cNvSpPr>
+          <p:nvPr>
+            <p:ph type="ftr" sz="quarter" idx="11"/>
+          </p:nvPr>
+        </p:nvSpPr>
+        <p:spPr/>
+        <p:txBody>
+          <a:bodyPr/>
+          <a:lstStyle/>
+          <a:p>
+            <a:pPr algn="r"/>
+            <a:r>
+              <a:rPr lang="bg-BG" dirty="0" smtClean="0"/>
+              <a:t>Русе</a:t>
             </a:r>
             <a:endParaRPr lang="en-US" dirty="0"/>
           </a:p>
@@ -7509,7 +7443,7 @@
         </p:blipFill>
         <p:spPr>
           <a:xfrm>
-            <a:off x="7797457" y="4659086"/>
+            <a:off x="7645057" y="4659086"/>
             <a:ext cx="4394543" cy="1680764"/>
           </a:xfrm>
           <a:prstGeom prst="rect">
@@ -7519,36 +7453,6 @@
       </p:pic>
       <p:sp>
         <p:nvSpPr>
-          <p:cNvPr id="6" name="TextBox 5"/>
-          <p:cNvSpPr txBox="1"/>
-          <p:nvPr/>
-        </p:nvSpPr>
-        <p:spPr>
-          <a:xfrm>
-            <a:off x="1208314" y="1894114"/>
-            <a:ext cx="9144000" cy="400110"/>
-          </a:xfrm>
-          <a:prstGeom prst="rect">
-            <a:avLst/>
-          </a:prstGeom>
-          <a:noFill/>
-        </p:spPr>
-        <p:txBody>
-          <a:bodyPr wrap="square" rtlCol="0">
-            <a:spAutoFit/>
-          </a:bodyPr>
-          <a:lstStyle/>
-          <a:p>
-            <a:pPr marL="285750" indent="-285750">
-              <a:buFont typeface="Arial" panose="020B0604020202020204" pitchFamily="34" charset="0"/>
-              <a:buChar char="•"/>
-            </a:pPr>
-            <a:endParaRPr lang="en-US" sz="2000" dirty="0"/>
-          </a:p>
-        </p:txBody>
-      </p:sp>
-      <p:sp>
-        <p:nvSpPr>
           <p:cNvPr id="13" name="Subtitle 2"/>
           <p:cNvSpPr txBox="1">
             <a:spLocks/>
@@ -7557,7 +7461,7 @@
         </p:nvSpPr>
         <p:spPr>
           <a:xfrm>
-            <a:off x="1097280" y="1857295"/>
+            <a:off x="1075508" y="1012449"/>
             <a:ext cx="9527767" cy="436929"/>
           </a:xfrm>
           <a:prstGeom prst="rect">
@@ -7815,292 +7719,45 @@
           <a:p>
             <a:r>
               <a:rPr lang="bg-BG" sz="2800" b="1" dirty="0" smtClean="0"/>
-              <a:t>Модул за сегментация</a:t>
+              <a:t>Модул за сегментация - метод</a:t>
             </a:r>
             <a:endParaRPr lang="en-US" sz="2800" dirty="0"/>
           </a:p>
         </p:txBody>
       </p:sp>
-      <p:sp>
-        <p:nvSpPr>
-          <p:cNvPr id="14" name="Footer Placeholder 3"/>
-          <p:cNvSpPr>
-            <a:spLocks noGrp="1"/>
-          </p:cNvSpPr>
-          <p:nvPr>
-            <p:ph type="ftr" sz="quarter" idx="11"/>
-          </p:nvPr>
-        </p:nvSpPr>
-        <p:spPr>
-          <a:xfrm>
-            <a:off x="3686184" y="6459785"/>
-            <a:ext cx="7469495" cy="365125"/>
-          </a:xfrm>
-        </p:spPr>
-        <p:txBody>
-          <a:bodyPr/>
-          <a:lstStyle/>
-          <a:p>
-            <a:pPr algn="r"/>
-            <a:r>
-              <a:rPr lang="bg-BG" dirty="0" smtClean="0"/>
-              <a:t>Русе</a:t>
-            </a:r>
-            <a:endParaRPr lang="en-US" dirty="0"/>
-          </a:p>
-        </p:txBody>
-      </p:sp>
-      <p:sp>
-        <p:nvSpPr>
-          <p:cNvPr id="4" name="TextBox 3"/>
-          <p:cNvSpPr txBox="1"/>
-          <p:nvPr/>
-        </p:nvSpPr>
-        <p:spPr>
-          <a:xfrm>
-            <a:off x="5664612" y="3291839"/>
-            <a:ext cx="3261673" cy="276999"/>
-          </a:xfrm>
-          <a:prstGeom prst="rect">
-            <a:avLst/>
-          </a:prstGeom>
-          <a:noFill/>
-        </p:spPr>
-        <p:txBody>
-          <a:bodyPr wrap="square" lIns="0" tIns="0" rIns="0" bIns="0" rtlCol="0">
-            <a:spAutoFit/>
-          </a:bodyPr>
-          <a:lstStyle/>
-          <a:p>
-            <a:endParaRPr lang="en-US" dirty="0"/>
-          </a:p>
-        </p:txBody>
-      </p:sp>
-      <mc:AlternateContent xmlns:mc="http://schemas.openxmlformats.org/markup-compatibility/2006" xmlns:a14="http://schemas.microsoft.com/office/drawing/2010/main">
-        <mc:Choice Requires="a14">
-          <p:sp>
-            <p:nvSpPr>
-              <p:cNvPr id="7" name="Rectangle 6"/>
-              <p:cNvSpPr/>
-              <p:nvPr/>
-            </p:nvSpPr>
-            <p:spPr>
-              <a:xfrm>
-                <a:off x="1208314" y="2680903"/>
-                <a:ext cx="5422831" cy="610936"/>
-              </a:xfrm>
-              <a:prstGeom prst="rect">
-                <a:avLst/>
-              </a:prstGeom>
-            </p:spPr>
-            <p:txBody>
-              <a:bodyPr wrap="none">
-                <a:spAutoFit/>
-              </a:bodyPr>
-              <a:lstStyle/>
-              <a:p>
-                <a:pPr/>
-                <a14:m>
-                  <m:oMathPara xmlns:m="http://schemas.openxmlformats.org/officeDocument/2006/math">
-                    <m:oMathParaPr>
-                      <m:jc m:val="centerGroup"/>
-                    </m:oMathParaPr>
-                    <m:oMath xmlns:m="http://schemas.openxmlformats.org/officeDocument/2006/math">
-                      <m:r>
-                        <m:rPr>
-                          <m:sty m:val="p"/>
-                        </m:rPr>
-                        <a:rPr lang="en-US" i="1">
-                          <a:latin typeface="Cambria Math" panose="02040503050406030204" pitchFamily="18" charset="0"/>
-                        </a:rPr>
-                        <m:t>h</m:t>
-                      </m:r>
-                      <m:r>
-                        <a:rPr lang="en-US" i="1">
-                          <a:latin typeface="Cambria Math" panose="02040503050406030204" pitchFamily="18" charset="0"/>
-                        </a:rPr>
-                        <m:t>𝑎𝑛𝑑</m:t>
-                      </m:r>
-                      <m:r>
-                        <m:rPr>
-                          <m:lit/>
-                        </m:rPr>
-                        <a:rPr lang="en-US" i="0">
-                          <a:latin typeface="Cambria Math" panose="02040503050406030204" pitchFamily="18" charset="0"/>
-                        </a:rPr>
-                        <m:t>_</m:t>
-                      </m:r>
-                      <m:r>
-                        <a:rPr lang="en-US" i="1">
-                          <a:latin typeface="Cambria Math" panose="02040503050406030204" pitchFamily="18" charset="0"/>
-                        </a:rPr>
-                        <m:t>𝑚𝑎𝑟𝑘𝑒𝑟</m:t>
-                      </m:r>
-                      <m:r>
-                        <a:rPr lang="en-US" i="0">
-                          <a:latin typeface="Cambria Math" panose="02040503050406030204" pitchFamily="18" charset="0"/>
-                        </a:rPr>
-                        <m:t> =</m:t>
-                      </m:r>
-                      <m:f>
-                        <m:fPr>
-                          <m:ctrlPr>
-                            <a:rPr lang="en-US" i="1">
-                              <a:latin typeface="Cambria Math" panose="02040503050406030204" pitchFamily="18" charset="0"/>
-                            </a:rPr>
-                          </m:ctrlPr>
-                        </m:fPr>
-                        <m:num>
-                          <m:r>
-                            <m:rPr>
-                              <m:sty m:val="p"/>
-                            </m:rPr>
-                            <a:rPr lang="en-US" i="0">
-                              <a:latin typeface="Cambria Math" panose="02040503050406030204" pitchFamily="18" charset="0"/>
-                            </a:rPr>
-                            <m:t>OWR</m:t>
-                          </m:r>
-                          <m:r>
-                            <a:rPr lang="en-US" i="0">
-                              <a:latin typeface="Cambria Math" panose="02040503050406030204" pitchFamily="18" charset="0"/>
-                            </a:rPr>
-                            <m:t> + </m:t>
-                          </m:r>
-                          <m:r>
-                            <m:rPr>
-                              <m:sty m:val="p"/>
-                            </m:rPr>
-                            <a:rPr lang="en-US" i="0">
-                              <a:latin typeface="Cambria Math" panose="02040503050406030204" pitchFamily="18" charset="0"/>
-                            </a:rPr>
-                            <m:t>IWR</m:t>
-                          </m:r>
-                          <m:r>
-                            <a:rPr lang="en-US" i="0">
-                              <a:latin typeface="Cambria Math" panose="02040503050406030204" pitchFamily="18" charset="0"/>
-                            </a:rPr>
-                            <m:t> + </m:t>
-                          </m:r>
-                          <m:r>
-                            <m:rPr>
-                              <m:sty m:val="p"/>
-                            </m:rPr>
-                            <a:rPr lang="en-US" i="0">
-                              <a:latin typeface="Cambria Math" panose="02040503050406030204" pitchFamily="18" charset="0"/>
-                            </a:rPr>
-                            <m:t>OHAND</m:t>
-                          </m:r>
-                          <m:r>
-                            <a:rPr lang="en-US" i="0">
-                              <a:latin typeface="Cambria Math" panose="02040503050406030204" pitchFamily="18" charset="0"/>
-                            </a:rPr>
-                            <m:t> + </m:t>
-                          </m:r>
-                          <m:r>
-                            <m:rPr>
-                              <m:sty m:val="p"/>
-                            </m:rPr>
-                            <a:rPr lang="en-US" i="0">
-                              <a:latin typeface="Cambria Math" panose="02040503050406030204" pitchFamily="18" charset="0"/>
-                            </a:rPr>
-                            <m:t>HAND</m:t>
-                          </m:r>
-                        </m:num>
-                        <m:den>
-                          <m:r>
-                            <a:rPr lang="en-US" i="0">
-                              <a:latin typeface="Cambria Math" panose="02040503050406030204" pitchFamily="18" charset="0"/>
-                            </a:rPr>
-                            <m:t>4</m:t>
-                          </m:r>
-                        </m:den>
-                      </m:f>
-                    </m:oMath>
-                  </m:oMathPara>
-                </a14:m>
-                <a:endParaRPr lang="en-US" dirty="0"/>
-              </a:p>
-            </p:txBody>
-          </p:sp>
-        </mc:Choice>
-        <mc:Fallback xmlns="">
-          <p:sp>
-            <p:nvSpPr>
-              <p:cNvPr id="7" name="Rectangle 6"/>
-              <p:cNvSpPr>
-                <a:spLocks noRot="1" noChangeAspect="1" noMove="1" noResize="1" noEditPoints="1" noAdjustHandles="1" noChangeArrowheads="1" noChangeShapeType="1" noTextEdit="1"/>
-              </p:cNvSpPr>
-              <p:nvPr/>
-            </p:nvSpPr>
-            <p:spPr>
-              <a:xfrm>
-                <a:off x="1208314" y="2680903"/>
-                <a:ext cx="5422831" cy="610936"/>
-              </a:xfrm>
-              <a:prstGeom prst="rect">
-                <a:avLst/>
-              </a:prstGeom>
-              <a:blipFill>
-                <a:blip r:embed="rId4"/>
-                <a:stretch>
-                  <a:fillRect/>
-                </a:stretch>
-              </a:blipFill>
-            </p:spPr>
-            <p:txBody>
-              <a:bodyPr/>
-              <a:lstStyle/>
-              <a:p>
-                <a:r>
-                  <a:rPr lang="en-US">
-                    <a:noFill/>
-                  </a:rPr>
-                  <a:t> </a:t>
-                </a:r>
-              </a:p>
-            </p:txBody>
-          </p:sp>
-        </mc:Fallback>
-      </mc:AlternateContent>
       <p:pic>
         <p:nvPicPr>
-          <p:cNvPr id="12" name="Picture 11"/>
-          <p:cNvPicPr/>
+          <p:cNvPr id="8" name="Picture 7"/>
+          <p:cNvPicPr>
+            <a:picLocks noChangeAspect="1"/>
+          </p:cNvPicPr>
           <p:nvPr/>
         </p:nvPicPr>
         <p:blipFill rotWithShape="1">
-          <a:blip r:embed="rId5">
+          <a:blip r:embed="rId4">
             <a:extLst>
               <a:ext uri="{28A0092B-C50C-407E-A947-70E740481C1C}">
                 <a14:useLocalDpi xmlns:a14="http://schemas.microsoft.com/office/drawing/2010/main" val="0"/>
               </a:ext>
             </a:extLst>
           </a:blip>
-          <a:srcRect l="-2" t="38505" r="85048" b="42890"/>
+          <a:srcRect l="1677" b="5631"/>
           <a:stretch/>
         </p:blipFill>
-        <p:spPr bwMode="auto">
+        <p:spPr>
           <a:xfrm>
-            <a:off x="2642300" y="3865683"/>
-            <a:ext cx="2554857" cy="2020258"/>
+            <a:off x="1019693" y="1569313"/>
+            <a:ext cx="11172307" cy="4770537"/>
           </a:xfrm>
           <a:prstGeom prst="rect">
             <a:avLst/>
           </a:prstGeom>
-          <a:ln>
-            <a:noFill/>
-          </a:ln>
-          <a:extLst>
-            <a:ext uri="{53640926-AAD7-44D8-BBD7-CCE9431645EC}">
-              <a14:shadowObscured xmlns:a14="http://schemas.microsoft.com/office/drawing/2010/main"/>
-            </a:ext>
-          </a:extLst>
         </p:spPr>
       </p:pic>
     </p:spTree>
     <p:extLst>
       <p:ext uri="{BB962C8B-B14F-4D97-AF65-F5344CB8AC3E}">
-        <p14:creationId xmlns:p14="http://schemas.microsoft.com/office/powerpoint/2010/main" val="1447896153"/>
+        <p14:creationId xmlns:p14="http://schemas.microsoft.com/office/powerpoint/2010/main" val="3477249172"/>
       </p:ext>
     </p:extLst>
   </p:cSld>
@@ -8147,7 +7804,7 @@
         <p:spPr>
           <a:xfrm>
             <a:off x="1097280" y="286603"/>
-            <a:ext cx="10058400" cy="725845"/>
+            <a:ext cx="10058400" cy="769311"/>
           </a:xfrm>
         </p:spPr>
         <p:txBody>
@@ -8180,30 +7837,6 @@
             <a:r>
               <a:rPr lang="en-US" smtClean="0"/>
               <a:t>9/20/2018</a:t>
-            </a:r>
-            <a:endParaRPr lang="en-US" dirty="0"/>
-          </a:p>
-        </p:txBody>
-      </p:sp>
-      <p:sp>
-        <p:nvSpPr>
-          <p:cNvPr id="9" name="Footer Placeholder 3"/>
-          <p:cNvSpPr>
-            <a:spLocks noGrp="1"/>
-          </p:cNvSpPr>
-          <p:nvPr>
-            <p:ph type="ftr" sz="quarter" idx="11"/>
-          </p:nvPr>
-        </p:nvSpPr>
-        <p:spPr/>
-        <p:txBody>
-          <a:bodyPr/>
-          <a:lstStyle/>
-          <a:p>
-            <a:pPr algn="r"/>
-            <a:r>
-              <a:rPr lang="bg-BG" dirty="0" smtClean="0"/>
-              <a:t>Русе</a:t>
             </a:r>
             <a:endParaRPr lang="en-US" dirty="0"/>
           </a:p>
@@ -8230,7 +7863,7 @@
         </p:blipFill>
         <p:spPr>
           <a:xfrm>
-            <a:off x="7645057" y="4659086"/>
+            <a:off x="7797457" y="4659086"/>
             <a:ext cx="4394543" cy="1680764"/>
           </a:xfrm>
           <a:prstGeom prst="rect">
@@ -8248,7 +7881,7 @@
         </p:nvSpPr>
         <p:spPr>
           <a:xfrm>
-            <a:off x="1075508" y="1012449"/>
+            <a:off x="1097280" y="1028966"/>
             <a:ext cx="9527767" cy="436929"/>
           </a:xfrm>
           <a:prstGeom prst="rect">
@@ -8506,21 +8139,50 @@
           <a:p>
             <a:r>
               <a:rPr lang="bg-BG" sz="2800" b="1" dirty="0" smtClean="0"/>
-              <a:t>Модул за сегментация - метод</a:t>
+              <a:t>Модул за сегментация - скорост</a:t>
             </a:r>
             <a:endParaRPr lang="en-US" sz="2800" dirty="0"/>
+          </a:p>
+        </p:txBody>
+      </p:sp>
+      <p:sp>
+        <p:nvSpPr>
+          <p:cNvPr id="9" name="Footer Placeholder 3"/>
+          <p:cNvSpPr>
+            <a:spLocks noGrp="1"/>
+          </p:cNvSpPr>
+          <p:nvPr>
+            <p:ph type="ftr" sz="quarter" idx="11"/>
+          </p:nvPr>
+        </p:nvSpPr>
+        <p:spPr>
+          <a:xfrm>
+            <a:off x="3686184" y="6459785"/>
+            <a:ext cx="7469495" cy="365125"/>
+          </a:xfrm>
+        </p:spPr>
+        <p:txBody>
+          <a:bodyPr/>
+          <a:lstStyle/>
+          <a:p>
+            <a:pPr algn="r"/>
+            <a:r>
+              <a:rPr lang="bg-BG" dirty="0" smtClean="0"/>
+              <a:t>Русе</a:t>
+            </a:r>
+            <a:endParaRPr lang="en-US" dirty="0"/>
           </a:p>
         </p:txBody>
       </p:sp>
       <p:pic>
         <p:nvPicPr>
-          <p:cNvPr id="8" name="Picture 7"/>
+          <p:cNvPr id="4" name="Picture 3"/>
           <p:cNvPicPr>
             <a:picLocks noChangeAspect="1"/>
           </p:cNvPicPr>
           <p:nvPr/>
         </p:nvPicPr>
-        <p:blipFill rotWithShape="1">
+        <p:blipFill>
           <a:blip r:embed="rId4">
             <a:extLst>
               <a:ext uri="{28A0092B-C50C-407E-A947-70E740481C1C}">
@@ -8528,13 +8190,14 @@
               </a:ext>
             </a:extLst>
           </a:blip>
-          <a:srcRect l="1677" b="5631"/>
-          <a:stretch/>
+          <a:stretch>
+            <a:fillRect/>
+          </a:stretch>
         </p:blipFill>
         <p:spPr>
           <a:xfrm>
-            <a:off x="1019693" y="1569313"/>
-            <a:ext cx="11172307" cy="4770537"/>
+            <a:off x="3180525" y="1737360"/>
+            <a:ext cx="9011475" cy="4589509"/>
           </a:xfrm>
           <a:prstGeom prst="rect">
             <a:avLst/>
@@ -8544,7 +8207,7 @@
     </p:spTree>
     <p:extLst>
       <p:ext uri="{BB962C8B-B14F-4D97-AF65-F5344CB8AC3E}">
-        <p14:creationId xmlns:p14="http://schemas.microsoft.com/office/powerpoint/2010/main" val="3477249172"/>
+        <p14:creationId xmlns:p14="http://schemas.microsoft.com/office/powerpoint/2010/main" val="2728592437"/>
       </p:ext>
     </p:extLst>
   </p:cSld>
@@ -8591,11 +8254,13 @@
         <p:spPr>
           <a:xfrm>
             <a:off x="1097280" y="286603"/>
-            <a:ext cx="10058400" cy="769311"/>
+            <a:ext cx="10058400" cy="703997"/>
           </a:xfrm>
         </p:spPr>
         <p:txBody>
-          <a:bodyPr/>
+          <a:bodyPr>
+            <a:normAutofit fontScale="90000"/>
+          </a:bodyPr>
           <a:lstStyle/>
           <a:p>
             <a:r>
@@ -8668,7 +8333,7 @@
         </p:nvSpPr>
         <p:spPr>
           <a:xfrm>
-            <a:off x="1097280" y="1028966"/>
+            <a:off x="1097280" y="1107873"/>
             <a:ext cx="9527767" cy="436929"/>
           </a:xfrm>
           <a:prstGeom prst="rect">
@@ -8926,458 +8591,6 @@
           <a:p>
             <a:r>
               <a:rPr lang="bg-BG" sz="2800" b="1" dirty="0" smtClean="0"/>
-              <a:t>Модул за сегментация - скорост</a:t>
-            </a:r>
-            <a:endParaRPr lang="en-US" sz="2800" dirty="0"/>
-          </a:p>
-        </p:txBody>
-      </p:sp>
-      <p:sp>
-        <p:nvSpPr>
-          <p:cNvPr id="9" name="Footer Placeholder 3"/>
-          <p:cNvSpPr>
-            <a:spLocks noGrp="1"/>
-          </p:cNvSpPr>
-          <p:nvPr>
-            <p:ph type="ftr" sz="quarter" idx="11"/>
-          </p:nvPr>
-        </p:nvSpPr>
-        <p:spPr>
-          <a:xfrm>
-            <a:off x="3686184" y="6459785"/>
-            <a:ext cx="7469495" cy="365125"/>
-          </a:xfrm>
-        </p:spPr>
-        <p:txBody>
-          <a:bodyPr/>
-          <a:lstStyle/>
-          <a:p>
-            <a:pPr algn="r"/>
-            <a:r>
-              <a:rPr lang="bg-BG" dirty="0" smtClean="0"/>
-              <a:t>Русе</a:t>
-            </a:r>
-            <a:endParaRPr lang="en-US" dirty="0"/>
-          </a:p>
-        </p:txBody>
-      </p:sp>
-      <p:pic>
-        <p:nvPicPr>
-          <p:cNvPr id="4" name="Picture 3"/>
-          <p:cNvPicPr>
-            <a:picLocks noChangeAspect="1"/>
-          </p:cNvPicPr>
-          <p:nvPr/>
-        </p:nvPicPr>
-        <p:blipFill>
-          <a:blip r:embed="rId4">
-            <a:extLst>
-              <a:ext uri="{28A0092B-C50C-407E-A947-70E740481C1C}">
-                <a14:useLocalDpi xmlns:a14="http://schemas.microsoft.com/office/drawing/2010/main" val="0"/>
-              </a:ext>
-            </a:extLst>
-          </a:blip>
-          <a:stretch>
-            <a:fillRect/>
-          </a:stretch>
-        </p:blipFill>
-        <p:spPr>
-          <a:xfrm>
-            <a:off x="3180525" y="1737360"/>
-            <a:ext cx="9011475" cy="4589509"/>
-          </a:xfrm>
-          <a:prstGeom prst="rect">
-            <a:avLst/>
-          </a:prstGeom>
-        </p:spPr>
-      </p:pic>
-    </p:spTree>
-    <p:extLst>
-      <p:ext uri="{BB962C8B-B14F-4D97-AF65-F5344CB8AC3E}">
-        <p14:creationId xmlns:p14="http://schemas.microsoft.com/office/powerpoint/2010/main" val="2728592437"/>
-      </p:ext>
-    </p:extLst>
-  </p:cSld>
-  <p:clrMapOvr>
-    <a:masterClrMapping/>
-  </p:clrMapOvr>
-  <p:timing>
-    <p:tnLst>
-      <p:par>
-        <p:cTn id="1" dur="indefinite" restart="never" nodeType="tmRoot"/>
-      </p:par>
-    </p:tnLst>
-  </p:timing>
-</p:sld>
-</file>
-
-<file path=ppt/slides/slide13.xml><?xml version="1.0" encoding="utf-8"?>
-<p:sld xmlns:a="http://schemas.openxmlformats.org/drawingml/2006/main" xmlns:r="http://schemas.openxmlformats.org/officeDocument/2006/relationships" xmlns:p="http://schemas.openxmlformats.org/presentationml/2006/main">
-  <p:cSld>
-    <p:spTree>
-      <p:nvGrpSpPr>
-        <p:cNvPr id="1" name=""/>
-        <p:cNvGrpSpPr/>
-        <p:nvPr/>
-      </p:nvGrpSpPr>
-      <p:grpSpPr>
-        <a:xfrm>
-          <a:off x="0" y="0"/>
-          <a:ext cx="0" cy="0"/>
-          <a:chOff x="0" y="0"/>
-          <a:chExt cx="0" cy="0"/>
-        </a:xfrm>
-      </p:grpSpPr>
-      <p:sp>
-        <p:nvSpPr>
-          <p:cNvPr id="2" name="Title 1"/>
-          <p:cNvSpPr>
-            <a:spLocks noGrp="1"/>
-          </p:cNvSpPr>
-          <p:nvPr>
-            <p:ph type="title"/>
-          </p:nvPr>
-        </p:nvSpPr>
-        <p:spPr>
-          <a:xfrm>
-            <a:off x="1097280" y="286603"/>
-            <a:ext cx="10058400" cy="703997"/>
-          </a:xfrm>
-        </p:spPr>
-        <p:txBody>
-          <a:bodyPr>
-            <a:normAutofit fontScale="90000"/>
-          </a:bodyPr>
-          <a:lstStyle/>
-          <a:p>
-            <a:r>
-              <a:rPr lang="bg-BG" dirty="0" smtClean="0"/>
-              <a:t>Архитектура на системата</a:t>
-            </a:r>
-            <a:endParaRPr lang="en-US" dirty="0"/>
-          </a:p>
-        </p:txBody>
-      </p:sp>
-      <p:sp>
-        <p:nvSpPr>
-          <p:cNvPr id="3" name="Date Placeholder 2"/>
-          <p:cNvSpPr>
-            <a:spLocks noGrp="1"/>
-          </p:cNvSpPr>
-          <p:nvPr>
-            <p:ph type="dt" sz="half" idx="10"/>
-          </p:nvPr>
-        </p:nvSpPr>
-        <p:spPr/>
-        <p:txBody>
-          <a:bodyPr/>
-          <a:lstStyle/>
-          <a:p>
-            <a:r>
-              <a:rPr lang="en-US" smtClean="0"/>
-              <a:t>9/20/2018</a:t>
-            </a:r>
-            <a:endParaRPr lang="en-US" dirty="0"/>
-          </a:p>
-        </p:txBody>
-      </p:sp>
-      <p:pic>
-        <p:nvPicPr>
-          <p:cNvPr id="5" name="Picture 4"/>
-          <p:cNvPicPr>
-            <a:picLocks noChangeAspect="1"/>
-          </p:cNvPicPr>
-          <p:nvPr/>
-        </p:nvPicPr>
-        <p:blipFill rotWithShape="1">
-          <a:blip r:embed="rId3">
-            <a:extLst>
-              <a:ext uri="{28A0092B-C50C-407E-A947-70E740481C1C}">
-                <a14:useLocalDpi xmlns:a14="http://schemas.microsoft.com/office/drawing/2010/main" val="0"/>
-              </a:ext>
-            </a:extLst>
-          </a:blip>
-          <a:srcRect l="23204" t="41071" r="23316"/>
-          <a:stretch/>
-        </p:blipFill>
-        <p:spPr>
-          <a:xfrm>
-            <a:off x="7797457" y="4659086"/>
-            <a:ext cx="4394543" cy="1680764"/>
-          </a:xfrm>
-          <a:prstGeom prst="rect">
-            <a:avLst/>
-          </a:prstGeom>
-        </p:spPr>
-      </p:pic>
-      <p:sp>
-        <p:nvSpPr>
-          <p:cNvPr id="13" name="Subtitle 2"/>
-          <p:cNvSpPr txBox="1">
-            <a:spLocks/>
-          </p:cNvSpPr>
-          <p:nvPr/>
-        </p:nvSpPr>
-        <p:spPr>
-          <a:xfrm>
-            <a:off x="1097280" y="1107873"/>
-            <a:ext cx="9527767" cy="436929"/>
-          </a:xfrm>
-          <a:prstGeom prst="rect">
-            <a:avLst/>
-          </a:prstGeom>
-        </p:spPr>
-        <p:txBody>
-          <a:bodyPr/>
-          <a:lstStyle>
-            <a:lvl1pPr marL="91440" indent="-91440" algn="l" defTabSz="914400" rtl="0" eaLnBrk="1" latinLnBrk="0" hangingPunct="1">
-              <a:lnSpc>
-                <a:spcPct val="90000"/>
-              </a:lnSpc>
-              <a:spcBef>
-                <a:spcPts val="1200"/>
-              </a:spcBef>
-              <a:spcAft>
-                <a:spcPts val="200"/>
-              </a:spcAft>
-              <a:buClr>
-                <a:schemeClr val="accent1"/>
-              </a:buClr>
-              <a:buSzPct val="100000"/>
-              <a:buFont typeface="Calibri" panose="020F0502020204030204" pitchFamily="34" charset="0"/>
-              <a:buChar char=" "/>
-              <a:defRPr sz="2000" kern="1200">
-                <a:solidFill>
-                  <a:schemeClr val="tx1">
-                    <a:lumMod val="75000"/>
-                    <a:lumOff val="25000"/>
-                  </a:schemeClr>
-                </a:solidFill>
-                <a:latin typeface="+mn-lt"/>
-                <a:ea typeface="+mn-ea"/>
-                <a:cs typeface="+mn-cs"/>
-              </a:defRPr>
-            </a:lvl1pPr>
-            <a:lvl2pPr marL="384048" indent="-182880" algn="l" defTabSz="914400" rtl="0" eaLnBrk="1" latinLnBrk="0" hangingPunct="1">
-              <a:lnSpc>
-                <a:spcPct val="90000"/>
-              </a:lnSpc>
-              <a:spcBef>
-                <a:spcPts val="200"/>
-              </a:spcBef>
-              <a:spcAft>
-                <a:spcPts val="400"/>
-              </a:spcAft>
-              <a:buClr>
-                <a:schemeClr val="accent1"/>
-              </a:buClr>
-              <a:buFont typeface="Calibri" pitchFamily="34" charset="0"/>
-              <a:buChar char="◦"/>
-              <a:defRPr sz="1800" kern="1200">
-                <a:solidFill>
-                  <a:schemeClr val="tx1">
-                    <a:lumMod val="75000"/>
-                    <a:lumOff val="25000"/>
-                  </a:schemeClr>
-                </a:solidFill>
-                <a:latin typeface="+mn-lt"/>
-                <a:ea typeface="+mn-ea"/>
-                <a:cs typeface="+mn-cs"/>
-              </a:defRPr>
-            </a:lvl2pPr>
-            <a:lvl3pPr marL="566928" indent="-182880" algn="l" defTabSz="914400" rtl="0" eaLnBrk="1" latinLnBrk="0" hangingPunct="1">
-              <a:lnSpc>
-                <a:spcPct val="90000"/>
-              </a:lnSpc>
-              <a:spcBef>
-                <a:spcPts val="200"/>
-              </a:spcBef>
-              <a:spcAft>
-                <a:spcPts val="400"/>
-              </a:spcAft>
-              <a:buClr>
-                <a:schemeClr val="accent1"/>
-              </a:buClr>
-              <a:buFont typeface="Calibri" pitchFamily="34" charset="0"/>
-              <a:buChar char="◦"/>
-              <a:defRPr sz="1400" kern="1200">
-                <a:solidFill>
-                  <a:schemeClr val="tx1">
-                    <a:lumMod val="75000"/>
-                    <a:lumOff val="25000"/>
-                  </a:schemeClr>
-                </a:solidFill>
-                <a:latin typeface="+mn-lt"/>
-                <a:ea typeface="+mn-ea"/>
-                <a:cs typeface="+mn-cs"/>
-              </a:defRPr>
-            </a:lvl3pPr>
-            <a:lvl4pPr marL="749808" indent="-182880" algn="l" defTabSz="914400" rtl="0" eaLnBrk="1" latinLnBrk="0" hangingPunct="1">
-              <a:lnSpc>
-                <a:spcPct val="90000"/>
-              </a:lnSpc>
-              <a:spcBef>
-                <a:spcPts val="200"/>
-              </a:spcBef>
-              <a:spcAft>
-                <a:spcPts val="400"/>
-              </a:spcAft>
-              <a:buClr>
-                <a:schemeClr val="accent1"/>
-              </a:buClr>
-              <a:buFont typeface="Calibri" pitchFamily="34" charset="0"/>
-              <a:buChar char="◦"/>
-              <a:defRPr sz="1400" kern="1200">
-                <a:solidFill>
-                  <a:schemeClr val="tx1">
-                    <a:lumMod val="75000"/>
-                    <a:lumOff val="25000"/>
-                  </a:schemeClr>
-                </a:solidFill>
-                <a:latin typeface="+mn-lt"/>
-                <a:ea typeface="+mn-ea"/>
-                <a:cs typeface="+mn-cs"/>
-              </a:defRPr>
-            </a:lvl4pPr>
-            <a:lvl5pPr marL="932688" indent="-182880" algn="l" defTabSz="914400" rtl="0" eaLnBrk="1" latinLnBrk="0" hangingPunct="1">
-              <a:lnSpc>
-                <a:spcPct val="90000"/>
-              </a:lnSpc>
-              <a:spcBef>
-                <a:spcPts val="200"/>
-              </a:spcBef>
-              <a:spcAft>
-                <a:spcPts val="400"/>
-              </a:spcAft>
-              <a:buClr>
-                <a:schemeClr val="accent1"/>
-              </a:buClr>
-              <a:buFont typeface="Calibri" pitchFamily="34" charset="0"/>
-              <a:buChar char="◦"/>
-              <a:defRPr sz="1400" kern="1200">
-                <a:solidFill>
-                  <a:schemeClr val="tx1">
-                    <a:lumMod val="75000"/>
-                    <a:lumOff val="25000"/>
-                  </a:schemeClr>
-                </a:solidFill>
-                <a:latin typeface="+mn-lt"/>
-                <a:ea typeface="+mn-ea"/>
-                <a:cs typeface="+mn-cs"/>
-              </a:defRPr>
-            </a:lvl5pPr>
-            <a:lvl6pPr marL="1100000" indent="-228600" algn="l" defTabSz="914400" rtl="0" eaLnBrk="1" latinLnBrk="0" hangingPunct="1">
-              <a:lnSpc>
-                <a:spcPct val="90000"/>
-              </a:lnSpc>
-              <a:spcBef>
-                <a:spcPts val="200"/>
-              </a:spcBef>
-              <a:spcAft>
-                <a:spcPts val="400"/>
-              </a:spcAft>
-              <a:buClr>
-                <a:schemeClr val="accent1"/>
-              </a:buClr>
-              <a:buFont typeface="Calibri" pitchFamily="34" charset="0"/>
-              <a:buChar char="◦"/>
-              <a:defRPr sz="1400" kern="1200">
-                <a:solidFill>
-                  <a:schemeClr val="tx1">
-                    <a:lumMod val="75000"/>
-                    <a:lumOff val="25000"/>
-                  </a:schemeClr>
-                </a:solidFill>
-                <a:latin typeface="+mn-lt"/>
-                <a:ea typeface="+mn-ea"/>
-                <a:cs typeface="+mn-cs"/>
-              </a:defRPr>
-            </a:lvl6pPr>
-            <a:lvl7pPr marL="1300000" indent="-228600" algn="l" defTabSz="914400" rtl="0" eaLnBrk="1" latinLnBrk="0" hangingPunct="1">
-              <a:lnSpc>
-                <a:spcPct val="90000"/>
-              </a:lnSpc>
-              <a:spcBef>
-                <a:spcPts val="200"/>
-              </a:spcBef>
-              <a:spcAft>
-                <a:spcPts val="400"/>
-              </a:spcAft>
-              <a:buClr>
-                <a:schemeClr val="accent1"/>
-              </a:buClr>
-              <a:buFont typeface="Calibri" pitchFamily="34" charset="0"/>
-              <a:buChar char="◦"/>
-              <a:defRPr sz="1400" kern="1200">
-                <a:solidFill>
-                  <a:schemeClr val="tx1">
-                    <a:lumMod val="75000"/>
-                    <a:lumOff val="25000"/>
-                  </a:schemeClr>
-                </a:solidFill>
-                <a:latin typeface="+mn-lt"/>
-                <a:ea typeface="+mn-ea"/>
-                <a:cs typeface="+mn-cs"/>
-              </a:defRPr>
-            </a:lvl7pPr>
-            <a:lvl8pPr marL="1500000" indent="-228600" algn="l" defTabSz="914400" rtl="0" eaLnBrk="1" latinLnBrk="0" hangingPunct="1">
-              <a:lnSpc>
-                <a:spcPct val="90000"/>
-              </a:lnSpc>
-              <a:spcBef>
-                <a:spcPts val="200"/>
-              </a:spcBef>
-              <a:spcAft>
-                <a:spcPts val="400"/>
-              </a:spcAft>
-              <a:buClr>
-                <a:schemeClr val="accent1"/>
-              </a:buClr>
-              <a:buFont typeface="Calibri" pitchFamily="34" charset="0"/>
-              <a:buChar char="◦"/>
-              <a:defRPr sz="1400" kern="1200">
-                <a:solidFill>
-                  <a:schemeClr val="tx1">
-                    <a:lumMod val="75000"/>
-                    <a:lumOff val="25000"/>
-                  </a:schemeClr>
-                </a:solidFill>
-                <a:latin typeface="+mn-lt"/>
-                <a:ea typeface="+mn-ea"/>
-                <a:cs typeface="+mn-cs"/>
-              </a:defRPr>
-            </a:lvl8pPr>
-            <a:lvl9pPr marL="1700000" indent="-228600" algn="l" defTabSz="914400" rtl="0" eaLnBrk="1" latinLnBrk="0" hangingPunct="1">
-              <a:lnSpc>
-                <a:spcPct val="90000"/>
-              </a:lnSpc>
-              <a:spcBef>
-                <a:spcPts val="200"/>
-              </a:spcBef>
-              <a:spcAft>
-                <a:spcPts val="400"/>
-              </a:spcAft>
-              <a:buClr>
-                <a:schemeClr val="accent1"/>
-              </a:buClr>
-              <a:buFont typeface="Calibri" pitchFamily="34" charset="0"/>
-              <a:buChar char="◦"/>
-              <a:defRPr sz="1400" kern="1200">
-                <a:solidFill>
-                  <a:schemeClr val="tx1">
-                    <a:lumMod val="75000"/>
-                    <a:lumOff val="25000"/>
-                  </a:schemeClr>
-                </a:solidFill>
-                <a:latin typeface="+mn-lt"/>
-                <a:ea typeface="+mn-ea"/>
-                <a:cs typeface="+mn-cs"/>
-              </a:defRPr>
-            </a:lvl9pPr>
-          </a:lstStyle>
-          <a:p>
-            <a:r>
-              <a:rPr lang="bg-BG" sz="2800" b="1" dirty="0" smtClean="0"/>
               <a:t>Модул за сегментация - ускорение</a:t>
             </a:r>
             <a:endParaRPr lang="en-US" sz="2800" dirty="0"/>
@@ -9605,7 +8818,7 @@
 </p:sld>
 </file>
 
-<file path=ppt/slides/slide14.xml><?xml version="1.0" encoding="utf-8"?>
+<file path=ppt/slides/slide13.xml><?xml version="1.0" encoding="utf-8"?>
 <p:sld xmlns:a="http://schemas.openxmlformats.org/drawingml/2006/main" xmlns:r="http://schemas.openxmlformats.org/officeDocument/2006/relationships" xmlns:p="http://schemas.openxmlformats.org/presentationml/2006/main">
   <p:cSld>
     <p:spTree>
@@ -10305,7 +9518,7 @@
 </p:sld>
 </file>
 
-<file path=ppt/slides/slide15.xml><?xml version="1.0" encoding="utf-8"?>
+<file path=ppt/slides/slide14.xml><?xml version="1.0" encoding="utf-8"?>
 <p:sld xmlns:a="http://schemas.openxmlformats.org/drawingml/2006/main" xmlns:r="http://schemas.openxmlformats.org/officeDocument/2006/relationships" xmlns:p="http://schemas.openxmlformats.org/presentationml/2006/main">
   <p:cSld>
     <p:spTree>
@@ -10749,7 +9962,7 @@
 </p:sld>
 </file>
 
-<file path=ppt/slides/slide16.xml><?xml version="1.0" encoding="utf-8"?>
+<file path=ppt/slides/slide15.xml><?xml version="1.0" encoding="utf-8"?>
 <p:sld xmlns:a="http://schemas.openxmlformats.org/drawingml/2006/main" xmlns:r="http://schemas.openxmlformats.org/officeDocument/2006/relationships" xmlns:p="http://schemas.openxmlformats.org/presentationml/2006/main">
   <p:cSld>
     <p:spTree>
@@ -11224,7 +10437,7 @@
 </p:sld>
 </file>
 
-<file path=ppt/slides/slide17.xml><?xml version="1.0" encoding="utf-8"?>
+<file path=ppt/slides/slide16.xml><?xml version="1.0" encoding="utf-8"?>
 <p:sld xmlns:a="http://schemas.openxmlformats.org/drawingml/2006/main" xmlns:r="http://schemas.openxmlformats.org/officeDocument/2006/relationships" xmlns:p="http://schemas.openxmlformats.org/presentationml/2006/main">
   <p:cSld>
     <p:spTree>
@@ -11728,7 +10941,7 @@
 </p:sld>
 </file>
 
-<file path=ppt/slides/slide18.xml><?xml version="1.0" encoding="utf-8"?>
+<file path=ppt/slides/slide17.xml><?xml version="1.0" encoding="utf-8"?>
 <p:sld xmlns:a="http://schemas.openxmlformats.org/drawingml/2006/main" xmlns:r="http://schemas.openxmlformats.org/officeDocument/2006/relationships" xmlns:p="http://schemas.openxmlformats.org/presentationml/2006/main">
   <p:cSld>
     <p:spTree>
@@ -12173,7 +11386,7 @@
 </p:sld>
 </file>
 
-<file path=ppt/slides/slide19.xml><?xml version="1.0" encoding="utf-8"?>
+<file path=ppt/slides/slide18.xml><?xml version="1.0" encoding="utf-8"?>
 <p:sld xmlns:a="http://schemas.openxmlformats.org/drawingml/2006/main" xmlns:r="http://schemas.openxmlformats.org/officeDocument/2006/relationships" xmlns:p="http://schemas.openxmlformats.org/presentationml/2006/main">
   <p:cSld>
     <p:spTree>
@@ -12340,7 +11553,7 @@
         </p:nvGraphicFramePr>
         <p:xfrm>
           <a:off x="1208315" y="2100409"/>
-          <a:ext cx="9947366" cy="2558675"/>
+          <a:ext cx="9947366" cy="2637810"/>
         </p:xfrm>
         <a:graphic>
           <a:graphicData uri="http://schemas.openxmlformats.org/drawingml/2006/table">
@@ -14357,6 +13570,247 @@
 </p:sld>
 </file>
 
+<file path=ppt/slides/slide19.xml><?xml version="1.0" encoding="utf-8"?>
+<p:sld xmlns:a="http://schemas.openxmlformats.org/drawingml/2006/main" xmlns:r="http://schemas.openxmlformats.org/officeDocument/2006/relationships" xmlns:p="http://schemas.openxmlformats.org/presentationml/2006/main">
+  <p:cSld>
+    <p:spTree>
+      <p:nvGrpSpPr>
+        <p:cNvPr id="1" name=""/>
+        <p:cNvGrpSpPr/>
+        <p:nvPr/>
+      </p:nvGrpSpPr>
+      <p:grpSpPr>
+        <a:xfrm>
+          <a:off x="0" y="0"/>
+          <a:ext cx="0" cy="0"/>
+          <a:chOff x="0" y="0"/>
+          <a:chExt cx="0" cy="0"/>
+        </a:xfrm>
+      </p:grpSpPr>
+      <p:sp>
+        <p:nvSpPr>
+          <p:cNvPr id="2" name="Title 1"/>
+          <p:cNvSpPr>
+            <a:spLocks noGrp="1"/>
+          </p:cNvSpPr>
+          <p:nvPr>
+            <p:ph type="title"/>
+          </p:nvPr>
+        </p:nvSpPr>
+        <p:spPr/>
+        <p:txBody>
+          <a:bodyPr/>
+          <a:lstStyle/>
+          <a:p>
+            <a:r>
+              <a:rPr lang="bg-BG" dirty="0" smtClean="0"/>
+              <a:t>Бъдеща работа</a:t>
+            </a:r>
+            <a:endParaRPr lang="en-US" dirty="0"/>
+          </a:p>
+        </p:txBody>
+      </p:sp>
+      <p:sp>
+        <p:nvSpPr>
+          <p:cNvPr id="3" name="Date Placeholder 2"/>
+          <p:cNvSpPr>
+            <a:spLocks noGrp="1"/>
+          </p:cNvSpPr>
+          <p:nvPr>
+            <p:ph type="dt" sz="half" idx="10"/>
+          </p:nvPr>
+        </p:nvSpPr>
+        <p:spPr/>
+        <p:txBody>
+          <a:bodyPr/>
+          <a:lstStyle/>
+          <a:p>
+            <a:r>
+              <a:rPr lang="en-US" smtClean="0"/>
+              <a:t>9/20/2018</a:t>
+            </a:r>
+            <a:endParaRPr lang="en-US" dirty="0"/>
+          </a:p>
+        </p:txBody>
+      </p:sp>
+      <p:pic>
+        <p:nvPicPr>
+          <p:cNvPr id="5" name="Picture 4"/>
+          <p:cNvPicPr>
+            <a:picLocks noChangeAspect="1"/>
+          </p:cNvPicPr>
+          <p:nvPr/>
+        </p:nvPicPr>
+        <p:blipFill rotWithShape="1">
+          <a:blip r:embed="rId3">
+            <a:extLst>
+              <a:ext uri="{28A0092B-C50C-407E-A947-70E740481C1C}">
+                <a14:useLocalDpi xmlns:a14="http://schemas.microsoft.com/office/drawing/2010/main" val="0"/>
+              </a:ext>
+            </a:extLst>
+          </a:blip>
+          <a:srcRect l="23204" t="41071" r="23316"/>
+          <a:stretch/>
+        </p:blipFill>
+        <p:spPr>
+          <a:xfrm>
+            <a:off x="7797457" y="4659086"/>
+            <a:ext cx="4394543" cy="1680764"/>
+          </a:xfrm>
+          <a:prstGeom prst="rect">
+            <a:avLst/>
+          </a:prstGeom>
+        </p:spPr>
+      </p:pic>
+      <p:sp>
+        <p:nvSpPr>
+          <p:cNvPr id="6" name="TextBox 5"/>
+          <p:cNvSpPr txBox="1"/>
+          <p:nvPr/>
+        </p:nvSpPr>
+        <p:spPr>
+          <a:xfrm>
+            <a:off x="1208314" y="1894114"/>
+            <a:ext cx="9144000" cy="400110"/>
+          </a:xfrm>
+          <a:prstGeom prst="rect">
+            <a:avLst/>
+          </a:prstGeom>
+          <a:noFill/>
+        </p:spPr>
+        <p:txBody>
+          <a:bodyPr wrap="square" rtlCol="0">
+            <a:spAutoFit/>
+          </a:bodyPr>
+          <a:lstStyle/>
+          <a:p>
+            <a:pPr marL="285750" indent="-285750">
+              <a:buFont typeface="Arial" panose="020B0604020202020204" pitchFamily="34" charset="0"/>
+              <a:buChar char="•"/>
+            </a:pPr>
+            <a:endParaRPr lang="en-US" sz="2000" dirty="0"/>
+          </a:p>
+        </p:txBody>
+      </p:sp>
+      <p:sp>
+        <p:nvSpPr>
+          <p:cNvPr id="13" name="Footer Placeholder 3"/>
+          <p:cNvSpPr>
+            <a:spLocks noGrp="1"/>
+          </p:cNvSpPr>
+          <p:nvPr>
+            <p:ph type="ftr" sz="quarter" idx="11"/>
+          </p:nvPr>
+        </p:nvSpPr>
+        <p:spPr>
+          <a:xfrm>
+            <a:off x="3686184" y="6459785"/>
+            <a:ext cx="7469495" cy="365125"/>
+          </a:xfrm>
+        </p:spPr>
+        <p:txBody>
+          <a:bodyPr/>
+          <a:lstStyle/>
+          <a:p>
+            <a:pPr algn="r"/>
+            <a:r>
+              <a:rPr lang="bg-BG" dirty="0" smtClean="0"/>
+              <a:t>Русе</a:t>
+            </a:r>
+            <a:endParaRPr lang="en-US" dirty="0"/>
+          </a:p>
+        </p:txBody>
+      </p:sp>
+      <p:sp>
+        <p:nvSpPr>
+          <p:cNvPr id="4" name="TextBox 3"/>
+          <p:cNvSpPr txBox="1"/>
+          <p:nvPr/>
+        </p:nvSpPr>
+        <p:spPr>
+          <a:xfrm>
+            <a:off x="1208314" y="1894114"/>
+            <a:ext cx="9947365" cy="2585323"/>
+          </a:xfrm>
+          <a:prstGeom prst="rect">
+            <a:avLst/>
+          </a:prstGeom>
+          <a:noFill/>
+        </p:spPr>
+        <p:txBody>
+          <a:bodyPr wrap="square" rtlCol="0">
+            <a:spAutoFit/>
+          </a:bodyPr>
+          <a:lstStyle/>
+          <a:p>
+            <a:pPr marL="285750" indent="-285750">
+              <a:buFont typeface="Arial" panose="020B0604020202020204" pitchFamily="34" charset="0"/>
+              <a:buChar char="•"/>
+            </a:pPr>
+            <a:r>
+              <a:rPr lang="bg-BG" sz="2400" dirty="0" smtClean="0"/>
+              <a:t>Обогатяване на списъка със свойства на знака</a:t>
+            </a:r>
+          </a:p>
+          <a:p>
+            <a:pPr marL="285750" indent="-285750">
+              <a:buFont typeface="Arial" panose="020B0604020202020204" pitchFamily="34" charset="0"/>
+              <a:buChar char="•"/>
+            </a:pPr>
+            <a:r>
+              <a:rPr lang="bg-BG" sz="2400" dirty="0" smtClean="0"/>
+              <a:t>Реализиране на методи за определяне на ориентацията на ръката</a:t>
+            </a:r>
+          </a:p>
+          <a:p>
+            <a:pPr marL="285750" indent="-285750">
+              <a:buFont typeface="Arial" panose="020B0604020202020204" pitchFamily="34" charset="0"/>
+              <a:buChar char="•"/>
+            </a:pPr>
+            <a:r>
+              <a:rPr lang="bg-BG" sz="2400" dirty="0" smtClean="0"/>
+              <a:t>Реализиране на методи за определяне първоначалната форма на ръка както </a:t>
+            </a:r>
+          </a:p>
+          <a:p>
+            <a:pPr marL="285750" indent="-285750">
+              <a:buFont typeface="Arial" panose="020B0604020202020204" pitchFamily="34" charset="0"/>
+              <a:buChar char="•"/>
+            </a:pPr>
+            <a:r>
+              <a:rPr lang="bg-BG" sz="2400" dirty="0" smtClean="0"/>
+              <a:t>Реализиране на методи за машинно самообучение и класифициране на знаците</a:t>
+            </a:r>
+          </a:p>
+          <a:p>
+            <a:pPr marL="285750" indent="-285750">
+              <a:buFont typeface="Arial" panose="020B0604020202020204" pitchFamily="34" charset="0"/>
+              <a:buChar char="•"/>
+            </a:pPr>
+            <a:endParaRPr lang="en-US" dirty="0"/>
+          </a:p>
+        </p:txBody>
+      </p:sp>
+    </p:spTree>
+    <p:extLst>
+      <p:ext uri="{BB962C8B-B14F-4D97-AF65-F5344CB8AC3E}">
+        <p14:creationId xmlns:p14="http://schemas.microsoft.com/office/powerpoint/2010/main" val="1025209600"/>
+      </p:ext>
+    </p:extLst>
+  </p:cSld>
+  <p:clrMapOvr>
+    <a:masterClrMapping/>
+  </p:clrMapOvr>
+  <p:timing>
+    <p:tnLst>
+      <p:par>
+        <p:cTn id="1" dur="indefinite" restart="never" nodeType="tmRoot"/>
+      </p:par>
+    </p:tnLst>
+  </p:timing>
+</p:sld>
+</file>
+
 <file path=ppt/slides/slide2.xml><?xml version="1.0" encoding="utf-8"?>
 <p:sld xmlns:a="http://schemas.openxmlformats.org/drawingml/2006/main" xmlns:r="http://schemas.openxmlformats.org/officeDocument/2006/relationships" xmlns:p="http://schemas.openxmlformats.org/presentationml/2006/main">
   <p:cSld>
@@ -14629,247 +14083,6 @@
 </file>
 
 <file path=ppt/slides/slide20.xml><?xml version="1.0" encoding="utf-8"?>
-<p:sld xmlns:a="http://schemas.openxmlformats.org/drawingml/2006/main" xmlns:r="http://schemas.openxmlformats.org/officeDocument/2006/relationships" xmlns:p="http://schemas.openxmlformats.org/presentationml/2006/main">
-  <p:cSld>
-    <p:spTree>
-      <p:nvGrpSpPr>
-        <p:cNvPr id="1" name=""/>
-        <p:cNvGrpSpPr/>
-        <p:nvPr/>
-      </p:nvGrpSpPr>
-      <p:grpSpPr>
-        <a:xfrm>
-          <a:off x="0" y="0"/>
-          <a:ext cx="0" cy="0"/>
-          <a:chOff x="0" y="0"/>
-          <a:chExt cx="0" cy="0"/>
-        </a:xfrm>
-      </p:grpSpPr>
-      <p:sp>
-        <p:nvSpPr>
-          <p:cNvPr id="2" name="Title 1"/>
-          <p:cNvSpPr>
-            <a:spLocks noGrp="1"/>
-          </p:cNvSpPr>
-          <p:nvPr>
-            <p:ph type="title"/>
-          </p:nvPr>
-        </p:nvSpPr>
-        <p:spPr/>
-        <p:txBody>
-          <a:bodyPr/>
-          <a:lstStyle/>
-          <a:p>
-            <a:r>
-              <a:rPr lang="bg-BG" dirty="0" smtClean="0"/>
-              <a:t>Бъдеща работа</a:t>
-            </a:r>
-            <a:endParaRPr lang="en-US" dirty="0"/>
-          </a:p>
-        </p:txBody>
-      </p:sp>
-      <p:sp>
-        <p:nvSpPr>
-          <p:cNvPr id="3" name="Date Placeholder 2"/>
-          <p:cNvSpPr>
-            <a:spLocks noGrp="1"/>
-          </p:cNvSpPr>
-          <p:nvPr>
-            <p:ph type="dt" sz="half" idx="10"/>
-          </p:nvPr>
-        </p:nvSpPr>
-        <p:spPr/>
-        <p:txBody>
-          <a:bodyPr/>
-          <a:lstStyle/>
-          <a:p>
-            <a:r>
-              <a:rPr lang="en-US" smtClean="0"/>
-              <a:t>9/20/2018</a:t>
-            </a:r>
-            <a:endParaRPr lang="en-US" dirty="0"/>
-          </a:p>
-        </p:txBody>
-      </p:sp>
-      <p:pic>
-        <p:nvPicPr>
-          <p:cNvPr id="5" name="Picture 4"/>
-          <p:cNvPicPr>
-            <a:picLocks noChangeAspect="1"/>
-          </p:cNvPicPr>
-          <p:nvPr/>
-        </p:nvPicPr>
-        <p:blipFill rotWithShape="1">
-          <a:blip r:embed="rId3">
-            <a:extLst>
-              <a:ext uri="{28A0092B-C50C-407E-A947-70E740481C1C}">
-                <a14:useLocalDpi xmlns:a14="http://schemas.microsoft.com/office/drawing/2010/main" val="0"/>
-              </a:ext>
-            </a:extLst>
-          </a:blip>
-          <a:srcRect l="23204" t="41071" r="23316"/>
-          <a:stretch/>
-        </p:blipFill>
-        <p:spPr>
-          <a:xfrm>
-            <a:off x="7797457" y="4659086"/>
-            <a:ext cx="4394543" cy="1680764"/>
-          </a:xfrm>
-          <a:prstGeom prst="rect">
-            <a:avLst/>
-          </a:prstGeom>
-        </p:spPr>
-      </p:pic>
-      <p:sp>
-        <p:nvSpPr>
-          <p:cNvPr id="6" name="TextBox 5"/>
-          <p:cNvSpPr txBox="1"/>
-          <p:nvPr/>
-        </p:nvSpPr>
-        <p:spPr>
-          <a:xfrm>
-            <a:off x="1208314" y="1894114"/>
-            <a:ext cx="9144000" cy="400110"/>
-          </a:xfrm>
-          <a:prstGeom prst="rect">
-            <a:avLst/>
-          </a:prstGeom>
-          <a:noFill/>
-        </p:spPr>
-        <p:txBody>
-          <a:bodyPr wrap="square" rtlCol="0">
-            <a:spAutoFit/>
-          </a:bodyPr>
-          <a:lstStyle/>
-          <a:p>
-            <a:pPr marL="285750" indent="-285750">
-              <a:buFont typeface="Arial" panose="020B0604020202020204" pitchFamily="34" charset="0"/>
-              <a:buChar char="•"/>
-            </a:pPr>
-            <a:endParaRPr lang="en-US" sz="2000" dirty="0"/>
-          </a:p>
-        </p:txBody>
-      </p:sp>
-      <p:sp>
-        <p:nvSpPr>
-          <p:cNvPr id="13" name="Footer Placeholder 3"/>
-          <p:cNvSpPr>
-            <a:spLocks noGrp="1"/>
-          </p:cNvSpPr>
-          <p:nvPr>
-            <p:ph type="ftr" sz="quarter" idx="11"/>
-          </p:nvPr>
-        </p:nvSpPr>
-        <p:spPr>
-          <a:xfrm>
-            <a:off x="3686184" y="6459785"/>
-            <a:ext cx="7469495" cy="365125"/>
-          </a:xfrm>
-        </p:spPr>
-        <p:txBody>
-          <a:bodyPr/>
-          <a:lstStyle/>
-          <a:p>
-            <a:pPr algn="r"/>
-            <a:r>
-              <a:rPr lang="bg-BG" dirty="0" smtClean="0"/>
-              <a:t>Русе</a:t>
-            </a:r>
-            <a:endParaRPr lang="en-US" dirty="0"/>
-          </a:p>
-        </p:txBody>
-      </p:sp>
-      <p:sp>
-        <p:nvSpPr>
-          <p:cNvPr id="4" name="TextBox 3"/>
-          <p:cNvSpPr txBox="1"/>
-          <p:nvPr/>
-        </p:nvSpPr>
-        <p:spPr>
-          <a:xfrm>
-            <a:off x="1208314" y="1894114"/>
-            <a:ext cx="9947365" cy="2585323"/>
-          </a:xfrm>
-          <a:prstGeom prst="rect">
-            <a:avLst/>
-          </a:prstGeom>
-          <a:noFill/>
-        </p:spPr>
-        <p:txBody>
-          <a:bodyPr wrap="square" rtlCol="0">
-            <a:spAutoFit/>
-          </a:bodyPr>
-          <a:lstStyle/>
-          <a:p>
-            <a:pPr marL="285750" indent="-285750">
-              <a:buFont typeface="Arial" panose="020B0604020202020204" pitchFamily="34" charset="0"/>
-              <a:buChar char="•"/>
-            </a:pPr>
-            <a:r>
-              <a:rPr lang="bg-BG" sz="2400" dirty="0" smtClean="0"/>
-              <a:t>Обогатяване на списъка със свойства на знака</a:t>
-            </a:r>
-          </a:p>
-          <a:p>
-            <a:pPr marL="285750" indent="-285750">
-              <a:buFont typeface="Arial" panose="020B0604020202020204" pitchFamily="34" charset="0"/>
-              <a:buChar char="•"/>
-            </a:pPr>
-            <a:r>
-              <a:rPr lang="bg-BG" sz="2400" dirty="0" smtClean="0"/>
-              <a:t>Реализиране на методи за определяне на ориентацията на ръката</a:t>
-            </a:r>
-          </a:p>
-          <a:p>
-            <a:pPr marL="285750" indent="-285750">
-              <a:buFont typeface="Arial" panose="020B0604020202020204" pitchFamily="34" charset="0"/>
-              <a:buChar char="•"/>
-            </a:pPr>
-            <a:r>
-              <a:rPr lang="bg-BG" sz="2400" dirty="0" smtClean="0"/>
-              <a:t>Реализиране на методи за определяне първоначалната форма на ръка както </a:t>
-            </a:r>
-          </a:p>
-          <a:p>
-            <a:pPr marL="285750" indent="-285750">
-              <a:buFont typeface="Arial" panose="020B0604020202020204" pitchFamily="34" charset="0"/>
-              <a:buChar char="•"/>
-            </a:pPr>
-            <a:r>
-              <a:rPr lang="bg-BG" sz="2400" dirty="0" smtClean="0"/>
-              <a:t>Реализиране на методи за машинно самообучение и класифициране на знаците</a:t>
-            </a:r>
-          </a:p>
-          <a:p>
-            <a:pPr marL="285750" indent="-285750">
-              <a:buFont typeface="Arial" panose="020B0604020202020204" pitchFamily="34" charset="0"/>
-              <a:buChar char="•"/>
-            </a:pPr>
-            <a:endParaRPr lang="en-US" dirty="0"/>
-          </a:p>
-        </p:txBody>
-      </p:sp>
-    </p:spTree>
-    <p:extLst>
-      <p:ext uri="{BB962C8B-B14F-4D97-AF65-F5344CB8AC3E}">
-        <p14:creationId xmlns:p14="http://schemas.microsoft.com/office/powerpoint/2010/main" val="1025209600"/>
-      </p:ext>
-    </p:extLst>
-  </p:cSld>
-  <p:clrMapOvr>
-    <a:masterClrMapping/>
-  </p:clrMapOvr>
-  <p:timing>
-    <p:tnLst>
-      <p:par>
-        <p:cTn id="1" dur="indefinite" restart="never" nodeType="tmRoot"/>
-      </p:par>
-    </p:tnLst>
-  </p:timing>
-</p:sld>
-</file>
-
-<file path=ppt/slides/slide21.xml><?xml version="1.0" encoding="utf-8"?>
 <p:sld xmlns:a="http://schemas.openxmlformats.org/drawingml/2006/main" xmlns:r="http://schemas.openxmlformats.org/officeDocument/2006/relationships" xmlns:p="http://schemas.openxmlformats.org/presentationml/2006/main">
   <p:cSld>
     <p:spTree>

</xml_diff>